<commit_message>
* added two slides for big files, unicode and csv * moved wikipedia example upward and added stats for english wikipedia
</commit_message>
<xml_diff>
--- a/doc/presentation/Presentation.pptx
+++ b/doc/presentation/Presentation.pptx
@@ -5,16 +5,17 @@
     <p:sldMasterId id="2147483648" r:id="rId1"/>
   </p:sldMasterIdLst>
   <p:notesMasterIdLst>
-    <p:notesMasterId r:id="rId9"/>
+    <p:notesMasterId r:id="rId10"/>
   </p:notesMasterIdLst>
   <p:sldIdLst>
     <p:sldId id="256" r:id="rId2"/>
     <p:sldId id="257" r:id="rId3"/>
     <p:sldId id="258" r:id="rId4"/>
-    <p:sldId id="260" r:id="rId5"/>
+    <p:sldId id="265" r:id="rId5"/>
     <p:sldId id="264" r:id="rId6"/>
-    <p:sldId id="261" r:id="rId7"/>
-    <p:sldId id="263" r:id="rId8"/>
+    <p:sldId id="260" r:id="rId7"/>
+    <p:sldId id="261" r:id="rId8"/>
+    <p:sldId id="263" r:id="rId9"/>
   </p:sldIdLst>
   <p:sldSz cx="12192000" cy="6858000"/>
   <p:notesSz cx="6858000" cy="9144000"/>
@@ -600,49 +601,67 @@
           <a:lstStyle/>
           <a:p>
             <a:r>
-              <a:rPr lang="en-US" dirty="0" smtClean="0"/>
-              <a:t>“Shema”</a:t>
-            </a:r>
-          </a:p>
-          <a:p>
-            <a:pPr lvl="1"/>
-            <a:r>
-              <a:rPr lang="en-US" dirty="0" smtClean="0"/>
-              <a:t>Page {id, title, </a:t>
-            </a:r>
-            <a:r>
-              <a:rPr lang="en-US" dirty="0" err="1" smtClean="0"/>
-              <a:t>ctitle</a:t>
-            </a:r>
-            <a:r>
-              <a:rPr lang="en-US" dirty="0" smtClean="0"/>
-              <a:t>, length, text}</a:t>
-            </a:r>
-          </a:p>
-          <a:p>
-            <a:pPr lvl="1"/>
-            <a:r>
-              <a:rPr lang="en-US" dirty="0" err="1" smtClean="0"/>
-              <a:t>links_to</a:t>
-            </a:r>
-            <a:r>
-              <a:rPr lang="en-US" dirty="0" smtClean="0"/>
-              <a:t> {id1, id2}</a:t>
-            </a:r>
-          </a:p>
-          <a:p>
-            <a:pPr lvl="1"/>
-            <a:r>
-              <a:rPr lang="en-US" dirty="0" err="1" smtClean="0"/>
-              <a:t>first_links_to</a:t>
-            </a:r>
-            <a:r>
-              <a:rPr lang="en-US" dirty="0" smtClean="0"/>
-              <a:t> {id1, id2}</a:t>
-            </a:r>
-            <a:endParaRPr lang="de-AT" dirty="0" smtClean="0"/>
-          </a:p>
-          <a:p>
+              <a:rPr lang="de-AT" dirty="0" smtClean="0"/>
+              <a:t>Use</a:t>
+            </a:r>
+            <a:r>
+              <a:rPr lang="de-AT" baseline="0" dirty="0" smtClean="0"/>
+              <a:t> intelligent text editor -&gt; often very limited features</a:t>
+            </a:r>
+          </a:p>
+          <a:p>
+            <a:r>
+              <a:rPr lang="de-AT" baseline="0" dirty="0" smtClean="0"/>
+              <a:t>Process file line by line using a specially coded program</a:t>
+            </a:r>
+          </a:p>
+          <a:p>
+            <a:r>
+              <a:rPr lang="de-AT" baseline="0" dirty="0" smtClean="0"/>
+              <a:t>Even commercial editors fail</a:t>
+            </a:r>
+          </a:p>
+          <a:p>
+            <a:r>
+              <a:rPr lang="de-AT" baseline="0" dirty="0" smtClean="0"/>
+              <a:t>Read file in chunks -&gt; how to deal with regex?</a:t>
+            </a:r>
+          </a:p>
+          <a:p>
+            <a:r>
+              <a:rPr lang="de-AT" baseline="0" dirty="0" smtClean="0"/>
+              <a:t>Implement Split() lazyly</a:t>
+            </a:r>
+          </a:p>
+          <a:p>
+            <a:r>
+              <a:rPr lang="de-AT" baseline="0" dirty="0" smtClean="0"/>
+              <a:t>Use compiled regex</a:t>
+            </a:r>
+          </a:p>
+          <a:p>
+            <a:r>
+              <a:rPr lang="de-AT" baseline="0" dirty="0" smtClean="0"/>
+              <a:t>Paralellize intensive code (e.g. Regex), lock on output </a:t>
+            </a:r>
+          </a:p>
+          <a:p>
+            <a:r>
+              <a:rPr lang="de-AT" baseline="0" dirty="0" smtClean="0"/>
+              <a:t>Use bulk insert and CSV files</a:t>
+            </a:r>
+          </a:p>
+          <a:p>
+            <a:r>
+              <a:rPr lang="de-AT" baseline="0" dirty="0" smtClean="0"/>
+              <a:t>Must use full DB</a:t>
+            </a:r>
+          </a:p>
+          <a:p>
+            <a:r>
+              <a:rPr lang="de-AT" baseline="0" dirty="0" smtClean="0"/>
+              <a:t>Impossibru</a:t>
+            </a:r>
             <a:endParaRPr lang="de-AT" dirty="0"/>
           </a:p>
         </p:txBody>
@@ -664,7 +683,7 @@
           <a:p>
             <a:fld id="{2A4EA86E-C545-4FB0-A25B-842463AD0490}" type="slidenum">
               <a:rPr lang="de-AT" smtClean="0"/>
-              <a:t>5</a:t>
+              <a:t>3</a:t>
             </a:fld>
             <a:endParaRPr lang="de-AT"/>
           </a:p>
@@ -673,7 +692,7 @@
     </p:spTree>
     <p:extLst>
       <p:ext uri="{BB962C8B-B14F-4D97-AF65-F5344CB8AC3E}">
-        <p14:creationId xmlns:p14="http://schemas.microsoft.com/office/powerpoint/2010/main" val="3839585318"/>
+        <p14:creationId xmlns:p14="http://schemas.microsoft.com/office/powerpoint/2010/main" val="2705624383"/>
       </p:ext>
     </p:extLst>
   </p:cSld>
@@ -727,6 +746,50 @@
           <a:bodyPr/>
           <a:lstStyle/>
           <a:p>
+            <a:r>
+              <a:rPr lang="en-US" dirty="0" smtClean="0"/>
+              <a:t>“Shema”</a:t>
+            </a:r>
+          </a:p>
+          <a:p>
+            <a:pPr lvl="1"/>
+            <a:r>
+              <a:rPr lang="en-US" dirty="0" smtClean="0"/>
+              <a:t>Page {id, title, </a:t>
+            </a:r>
+            <a:r>
+              <a:rPr lang="en-US" dirty="0" err="1" smtClean="0"/>
+              <a:t>ctitle</a:t>
+            </a:r>
+            <a:r>
+              <a:rPr lang="en-US" dirty="0" smtClean="0"/>
+              <a:t>, length, text}</a:t>
+            </a:r>
+          </a:p>
+          <a:p>
+            <a:pPr lvl="1"/>
+            <a:r>
+              <a:rPr lang="en-US" dirty="0" err="1" smtClean="0"/>
+              <a:t>links_to</a:t>
+            </a:r>
+            <a:r>
+              <a:rPr lang="en-US" dirty="0" smtClean="0"/>
+              <a:t> {id1, id2}</a:t>
+            </a:r>
+          </a:p>
+          <a:p>
+            <a:pPr lvl="1"/>
+            <a:r>
+              <a:rPr lang="en-US" dirty="0" err="1" smtClean="0"/>
+              <a:t>first_links_to</a:t>
+            </a:r>
+            <a:r>
+              <a:rPr lang="en-US" dirty="0" smtClean="0"/>
+              <a:t> {id1, id2}</a:t>
+            </a:r>
+            <a:endParaRPr lang="de-AT" dirty="0" smtClean="0"/>
+          </a:p>
+          <a:p>
             <a:endParaRPr lang="de-AT" dirty="0"/>
           </a:p>
         </p:txBody>
@@ -748,7 +811,7 @@
           <a:p>
             <a:fld id="{2A4EA86E-C545-4FB0-A25B-842463AD0490}" type="slidenum">
               <a:rPr lang="de-AT" smtClean="0"/>
-              <a:t>6</a:t>
+              <a:t>5</a:t>
             </a:fld>
             <a:endParaRPr lang="de-AT"/>
           </a:p>
@@ -757,7 +820,7 @@
     </p:spTree>
     <p:extLst>
       <p:ext uri="{BB962C8B-B14F-4D97-AF65-F5344CB8AC3E}">
-        <p14:creationId xmlns:p14="http://schemas.microsoft.com/office/powerpoint/2010/main" val="3382124072"/>
+        <p14:creationId xmlns:p14="http://schemas.microsoft.com/office/powerpoint/2010/main" val="3839585318"/>
       </p:ext>
     </p:extLst>
   </p:cSld>
@@ -833,6 +896,90 @@
             <a:fld id="{2A4EA86E-C545-4FB0-A25B-842463AD0490}" type="slidenum">
               <a:rPr lang="de-AT" smtClean="0"/>
               <a:t>7</a:t>
+            </a:fld>
+            <a:endParaRPr lang="de-AT"/>
+          </a:p>
+        </p:txBody>
+      </p:sp>
+    </p:spTree>
+    <p:extLst>
+      <p:ext uri="{BB962C8B-B14F-4D97-AF65-F5344CB8AC3E}">
+        <p14:creationId xmlns:p14="http://schemas.microsoft.com/office/powerpoint/2010/main" val="3382124072"/>
+      </p:ext>
+    </p:extLst>
+  </p:cSld>
+  <p:clrMapOvr>
+    <a:masterClrMapping/>
+  </p:clrMapOvr>
+</p:notes>
+</file>
+
+<file path=ppt/notesSlides/notesSlide5.xml><?xml version="1.0" encoding="utf-8"?>
+<p:notes xmlns:a="http://schemas.openxmlformats.org/drawingml/2006/main" xmlns:r="http://schemas.openxmlformats.org/officeDocument/2006/relationships" xmlns:p="http://schemas.openxmlformats.org/presentationml/2006/main">
+  <p:cSld>
+    <p:spTree>
+      <p:nvGrpSpPr>
+        <p:cNvPr id="1" name=""/>
+        <p:cNvGrpSpPr/>
+        <p:nvPr/>
+      </p:nvGrpSpPr>
+      <p:grpSpPr>
+        <a:xfrm>
+          <a:off x="0" y="0"/>
+          <a:ext cx="0" cy="0"/>
+          <a:chOff x="0" y="0"/>
+          <a:chExt cx="0" cy="0"/>
+        </a:xfrm>
+      </p:grpSpPr>
+      <p:sp>
+        <p:nvSpPr>
+          <p:cNvPr id="2" name="Slide Image Placeholder 1"/>
+          <p:cNvSpPr>
+            <a:spLocks noGrp="1" noRot="1" noChangeAspect="1"/>
+          </p:cNvSpPr>
+          <p:nvPr>
+            <p:ph type="sldImg"/>
+          </p:nvPr>
+        </p:nvSpPr>
+        <p:spPr/>
+      </p:sp>
+      <p:sp>
+        <p:nvSpPr>
+          <p:cNvPr id="3" name="Notes Placeholder 2"/>
+          <p:cNvSpPr>
+            <a:spLocks noGrp="1"/>
+          </p:cNvSpPr>
+          <p:nvPr>
+            <p:ph type="body" idx="1"/>
+          </p:nvPr>
+        </p:nvSpPr>
+        <p:spPr/>
+        <p:txBody>
+          <a:bodyPr/>
+          <a:lstStyle/>
+          <a:p>
+            <a:endParaRPr lang="de-AT" dirty="0"/>
+          </a:p>
+        </p:txBody>
+      </p:sp>
+      <p:sp>
+        <p:nvSpPr>
+          <p:cNvPr id="4" name="Slide Number Placeholder 3"/>
+          <p:cNvSpPr>
+            <a:spLocks noGrp="1"/>
+          </p:cNvSpPr>
+          <p:nvPr>
+            <p:ph type="sldNum" sz="quarter" idx="10"/>
+          </p:nvPr>
+        </p:nvSpPr>
+        <p:spPr/>
+        <p:txBody>
+          <a:bodyPr/>
+          <a:lstStyle/>
+          <a:p>
+            <a:fld id="{2A4EA86E-C545-4FB0-A25B-842463AD0490}" type="slidenum">
+              <a:rPr lang="de-AT" smtClean="0"/>
+              <a:t>8</a:t>
             </a:fld>
             <a:endParaRPr lang="de-AT"/>
           </a:p>
@@ -3808,7 +3955,7 @@
           <a:p>
             <a:r>
               <a:rPr lang="en-US" dirty="0" smtClean="0"/>
-              <a:t>Contents</a:t>
+              <a:t>Overview</a:t>
             </a:r>
             <a:endParaRPr lang="de-AT" dirty="0"/>
           </a:p>
@@ -3831,25 +3978,39 @@
           <a:p>
             <a:r>
               <a:rPr lang="en-US" dirty="0" smtClean="0"/>
-              <a:t>Big Data – Big Files – Big Problems</a:t>
-            </a:r>
-          </a:p>
-          <a:p>
+              <a:t>Big files, Unicode and CSV</a:t>
+            </a:r>
+            <a:endParaRPr lang="en-US" dirty="0" smtClean="0"/>
+          </a:p>
+          <a:p>
+            <a:r>
+              <a:rPr lang="en-US" dirty="0"/>
+              <a:t>Example (Wikipedia</a:t>
+            </a:r>
             <a:r>
               <a:rPr lang="en-US" dirty="0" smtClean="0"/>
-              <a:t>Graph-DB Concepts</a:t>
-            </a:r>
+              <a:t>)</a:t>
+            </a:r>
+            <a:endParaRPr lang="en-US" dirty="0" smtClean="0"/>
           </a:p>
           <a:p>
             <a:r>
               <a:rPr lang="en-US" dirty="0" smtClean="0"/>
-              <a:t>Example (Wikipedia)</a:t>
-            </a:r>
-          </a:p>
-          <a:p>
+              <a:t>Graph-DB </a:t>
+            </a:r>
             <a:r>
               <a:rPr lang="en-US" dirty="0" smtClean="0"/>
-              <a:t>Neo4j vs MS-SQL</a:t>
+              <a:t>Concepts</a:t>
+            </a:r>
+          </a:p>
+          <a:p>
+            <a:r>
+              <a:rPr lang="en-US" dirty="0" smtClean="0"/>
+              <a:t>Neo4j </a:t>
+            </a:r>
+            <a:r>
+              <a:rPr lang="en-US" dirty="0" smtClean="0"/>
+              <a:t>vs MS-SQL</a:t>
             </a:r>
           </a:p>
           <a:p>
@@ -3935,18 +4096,138 @@
           </a:p>
         </p:txBody>
       </p:sp>
-      <p:pic>
-        <p:nvPicPr>
-          <p:cNvPr id="4" name="Content Placeholder 3"/>
-          <p:cNvPicPr>
-            <a:picLocks noGrp="1" noChangeAspect="1"/>
-          </p:cNvPicPr>
+      <p:sp>
+        <p:nvSpPr>
+          <p:cNvPr id="5" name="Content Placeholder 4"/>
+          <p:cNvSpPr>
+            <a:spLocks noGrp="1"/>
+          </p:cNvSpPr>
           <p:nvPr>
             <p:ph idx="1"/>
           </p:nvPr>
+        </p:nvSpPr>
+        <p:spPr>
+          <a:xfrm>
+            <a:off x="838200" y="1825624"/>
+            <a:ext cx="10515600" cy="4883519"/>
+          </a:xfrm>
+        </p:spPr>
+        <p:txBody>
+          <a:bodyPr>
+            <a:normAutofit/>
+          </a:bodyPr>
+          <a:lstStyle/>
+          <a:p>
+            <a:pPr marL="0" indent="0">
+              <a:buNone/>
+            </a:pPr>
+            <a:r>
+              <a:rPr lang="de-AT" dirty="0" smtClean="0"/>
+              <a:t>What if ...</a:t>
+            </a:r>
+          </a:p>
+          <a:p>
+            <a:pPr lvl="1"/>
+            <a:r>
+              <a:rPr lang="de-AT" dirty="0" smtClean="0"/>
+              <a:t>you have a file with 49 GiB?</a:t>
+            </a:r>
+          </a:p>
+          <a:p>
+            <a:pPr lvl="1"/>
+            <a:r>
+              <a:rPr lang="de-AT" dirty="0"/>
+              <a:t>you have </a:t>
+            </a:r>
+            <a:r>
+              <a:rPr lang="de-AT" dirty="0" smtClean="0"/>
+              <a:t>a file </a:t>
+            </a:r>
+            <a:r>
+              <a:rPr lang="de-AT" dirty="0"/>
+              <a:t>with </a:t>
+            </a:r>
+            <a:r>
+              <a:rPr lang="de-AT" dirty="0" smtClean="0"/>
+              <a:t>164.379.808 lines?</a:t>
+            </a:r>
+          </a:p>
+          <a:p>
+            <a:pPr lvl="1"/>
+            <a:r>
+              <a:rPr lang="de-AT" dirty="0"/>
+              <a:t>your editor search&amp;replaces </a:t>
+            </a:r>
+            <a:r>
+              <a:rPr lang="de-AT" dirty="0" smtClean="0"/>
+              <a:t>27 lines/s</a:t>
+            </a:r>
+          </a:p>
+          <a:p>
+            <a:pPr lvl="1"/>
+            <a:r>
+              <a:rPr lang="de-AT" dirty="0"/>
+              <a:t>a line is longer than a String can hold</a:t>
+            </a:r>
+            <a:r>
+              <a:rPr lang="de-AT" dirty="0" smtClean="0"/>
+              <a:t>?</a:t>
+            </a:r>
+          </a:p>
+          <a:p>
+            <a:pPr lvl="1"/>
+            <a:r>
+              <a:rPr lang="de-AT" dirty="0" smtClean="0"/>
+              <a:t>String.Split() fails to allocate enough memory?</a:t>
+            </a:r>
+          </a:p>
+          <a:p>
+            <a:pPr lvl="1"/>
+            <a:r>
+              <a:rPr lang="de-AT" dirty="0" smtClean="0"/>
+              <a:t>a regular expression runs 12 minutes ... on a single item?</a:t>
+            </a:r>
+          </a:p>
+          <a:p>
+            <a:pPr lvl="1"/>
+            <a:r>
+              <a:rPr lang="de-AT" dirty="0" smtClean="0"/>
+              <a:t>your file parser spends only 20% on disk IO?</a:t>
+            </a:r>
+          </a:p>
+          <a:p>
+            <a:pPr lvl="1"/>
+            <a:r>
+              <a:rPr lang="de-AT" dirty="0" smtClean="0"/>
+              <a:t>each line is an INSERT statement and your DB runs only 1000 queries/s?</a:t>
+            </a:r>
+          </a:p>
+          <a:p>
+            <a:pPr lvl="1"/>
+            <a:r>
+              <a:rPr lang="de-AT" dirty="0" smtClean="0"/>
+              <a:t>LocalDB cannot store tables larger than 10 GiB?</a:t>
+            </a:r>
+          </a:p>
+          <a:p>
+            <a:pPr lvl="1"/>
+            <a:r>
+              <a:rPr lang="de-AT" dirty="0" smtClean="0"/>
+              <a:t>you have to compute your primary keys yourself?</a:t>
+            </a:r>
+          </a:p>
+        </p:txBody>
+      </p:sp>
+      <p:pic>
+        <p:nvPicPr>
+          <p:cNvPr id="6" name="Content Placeholder 3"/>
+          <p:cNvPicPr>
+            <a:picLocks noChangeAspect="1"/>
+          </p:cNvPicPr>
+          <p:nvPr/>
         </p:nvPicPr>
         <p:blipFill>
-          <a:blip r:embed="rId2">
+          <a:blip r:embed="rId3">
             <a:extLst>
               <a:ext uri="{28A0092B-C50C-407E-A947-70E740481C1C}">
                 <a14:useLocalDpi xmlns:a14="http://schemas.microsoft.com/office/drawing/2010/main" val="0"/>
@@ -3959,11 +4240,60 @@
         </p:blipFill>
         <p:spPr>
           <a:xfrm>
-            <a:off x="3304785" y="2519950"/>
-            <a:ext cx="5582429" cy="2962688"/>
+            <a:off x="7589643" y="1825625"/>
+            <a:ext cx="2963473" cy="1610376"/>
           </a:xfrm>
+          <a:prstGeom prst="rect">
+            <a:avLst/>
+          </a:prstGeom>
         </p:spPr>
       </p:pic>
+      <p:sp>
+        <p:nvSpPr>
+          <p:cNvPr id="7" name="Rectangle 6"/>
+          <p:cNvSpPr/>
+          <p:nvPr/>
+        </p:nvSpPr>
+        <p:spPr>
+          <a:xfrm>
+            <a:off x="6244858" y="4224577"/>
+            <a:ext cx="2463209" cy="382772"/>
+          </a:xfrm>
+          <a:prstGeom prst="rect">
+            <a:avLst/>
+          </a:prstGeom>
+          <a:solidFill>
+            <a:schemeClr val="bg1"/>
+          </a:solidFill>
+          <a:ln>
+            <a:noFill/>
+          </a:ln>
+        </p:spPr>
+        <p:style>
+          <a:lnRef idx="2">
+            <a:schemeClr val="accent1">
+              <a:shade val="50000"/>
+            </a:schemeClr>
+          </a:lnRef>
+          <a:fillRef idx="1">
+            <a:schemeClr val="accent1"/>
+          </a:fillRef>
+          <a:effectRef idx="0">
+            <a:schemeClr val="accent1"/>
+          </a:effectRef>
+          <a:fontRef idx="minor">
+            <a:schemeClr val="lt1"/>
+          </a:fontRef>
+        </p:style>
+        <p:txBody>
+          <a:bodyPr rtlCol="0" anchor="ctr"/>
+          <a:lstStyle/>
+          <a:p>
+            <a:pPr algn="ctr"/>
+            <a:endParaRPr lang="de-AT"/>
+          </a:p>
+        </p:txBody>
+      </p:sp>
     </p:spTree>
     <p:extLst>
       <p:ext uri="{BB962C8B-B14F-4D97-AF65-F5344CB8AC3E}">
@@ -3977,9 +4307,623 @@
   <p:timing>
     <p:tnLst>
       <p:par>
-        <p:cTn id="1" dur="indefinite" restart="never" nodeType="tmRoot"/>
+        <p:cTn id="1" dur="indefinite" restart="never" nodeType="tmRoot">
+          <p:childTnLst>
+            <p:seq concurrent="1" nextAc="seek">
+              <p:cTn id="2" dur="indefinite" nodeType="mainSeq">
+                <p:childTnLst>
+                  <p:par>
+                    <p:cTn id="3" fill="hold">
+                      <p:stCondLst>
+                        <p:cond delay="indefinite"/>
+                        <p:cond evt="onBegin" delay="0">
+                          <p:tn val="2"/>
+                        </p:cond>
+                      </p:stCondLst>
+                      <p:childTnLst>
+                        <p:par>
+                          <p:cTn id="4" fill="hold">
+                            <p:stCondLst>
+                              <p:cond delay="0"/>
+                            </p:stCondLst>
+                            <p:childTnLst>
+                              <p:par>
+                                <p:cTn id="5" presetID="1" presetClass="entr" presetSubtype="0" fill="hold" grpId="0" nodeType="withEffect">
+                                  <p:stCondLst>
+                                    <p:cond delay="0"/>
+                                  </p:stCondLst>
+                                  <p:childTnLst>
+                                    <p:set>
+                                      <p:cBhvr>
+                                        <p:cTn id="6" dur="1" fill="hold">
+                                          <p:stCondLst>
+                                            <p:cond delay="0"/>
+                                          </p:stCondLst>
+                                        </p:cTn>
+                                        <p:tgtEl>
+                                          <p:spTgt spid="5">
+                                            <p:txEl>
+                                              <p:pRg st="0" end="0"/>
+                                            </p:txEl>
+                                          </p:spTgt>
+                                        </p:tgtEl>
+                                        <p:attrNameLst>
+                                          <p:attrName>style.visibility</p:attrName>
+                                        </p:attrNameLst>
+                                      </p:cBhvr>
+                                      <p:to>
+                                        <p:strVal val="visible"/>
+                                      </p:to>
+                                    </p:set>
+                                  </p:childTnLst>
+                                </p:cTn>
+                              </p:par>
+                            </p:childTnLst>
+                          </p:cTn>
+                        </p:par>
+                      </p:childTnLst>
+                    </p:cTn>
+                  </p:par>
+                  <p:par>
+                    <p:cTn id="7" fill="hold">
+                      <p:stCondLst>
+                        <p:cond delay="indefinite"/>
+                      </p:stCondLst>
+                      <p:childTnLst>
+                        <p:par>
+                          <p:cTn id="8" fill="hold">
+                            <p:stCondLst>
+                              <p:cond delay="0"/>
+                            </p:stCondLst>
+                            <p:childTnLst>
+                              <p:par>
+                                <p:cTn id="9" presetID="1" presetClass="entr" presetSubtype="0" fill="hold" grpId="0" nodeType="clickEffect">
+                                  <p:stCondLst>
+                                    <p:cond delay="0"/>
+                                  </p:stCondLst>
+                                  <p:childTnLst>
+                                    <p:set>
+                                      <p:cBhvr>
+                                        <p:cTn id="10" dur="1" fill="hold">
+                                          <p:stCondLst>
+                                            <p:cond delay="0"/>
+                                          </p:stCondLst>
+                                        </p:cTn>
+                                        <p:tgtEl>
+                                          <p:spTgt spid="5">
+                                            <p:txEl>
+                                              <p:pRg st="1" end="1"/>
+                                            </p:txEl>
+                                          </p:spTgt>
+                                        </p:tgtEl>
+                                        <p:attrNameLst>
+                                          <p:attrName>style.visibility</p:attrName>
+                                        </p:attrNameLst>
+                                      </p:cBhvr>
+                                      <p:to>
+                                        <p:strVal val="visible"/>
+                                      </p:to>
+                                    </p:set>
+                                  </p:childTnLst>
+                                </p:cTn>
+                              </p:par>
+                            </p:childTnLst>
+                          </p:cTn>
+                        </p:par>
+                      </p:childTnLst>
+                    </p:cTn>
+                  </p:par>
+                  <p:par>
+                    <p:cTn id="11" fill="hold">
+                      <p:stCondLst>
+                        <p:cond delay="indefinite"/>
+                      </p:stCondLst>
+                      <p:childTnLst>
+                        <p:par>
+                          <p:cTn id="12" fill="hold">
+                            <p:stCondLst>
+                              <p:cond delay="0"/>
+                            </p:stCondLst>
+                            <p:childTnLst>
+                              <p:par>
+                                <p:cTn id="13" presetID="1" presetClass="entr" presetSubtype="0" fill="hold" grpId="0" nodeType="clickEffect">
+                                  <p:stCondLst>
+                                    <p:cond delay="0"/>
+                                  </p:stCondLst>
+                                  <p:childTnLst>
+                                    <p:set>
+                                      <p:cBhvr>
+                                        <p:cTn id="14" dur="1" fill="hold">
+                                          <p:stCondLst>
+                                            <p:cond delay="0"/>
+                                          </p:stCondLst>
+                                        </p:cTn>
+                                        <p:tgtEl>
+                                          <p:spTgt spid="5">
+                                            <p:txEl>
+                                              <p:pRg st="2" end="2"/>
+                                            </p:txEl>
+                                          </p:spTgt>
+                                        </p:tgtEl>
+                                        <p:attrNameLst>
+                                          <p:attrName>style.visibility</p:attrName>
+                                        </p:attrNameLst>
+                                      </p:cBhvr>
+                                      <p:to>
+                                        <p:strVal val="visible"/>
+                                      </p:to>
+                                    </p:set>
+                                  </p:childTnLst>
+                                </p:cTn>
+                              </p:par>
+                            </p:childTnLst>
+                          </p:cTn>
+                        </p:par>
+                      </p:childTnLst>
+                    </p:cTn>
+                  </p:par>
+                  <p:par>
+                    <p:cTn id="15" fill="hold">
+                      <p:stCondLst>
+                        <p:cond delay="indefinite"/>
+                      </p:stCondLst>
+                      <p:childTnLst>
+                        <p:par>
+                          <p:cTn id="16" fill="hold">
+                            <p:stCondLst>
+                              <p:cond delay="0"/>
+                            </p:stCondLst>
+                            <p:childTnLst>
+                              <p:par>
+                                <p:cTn id="17" presetID="1" presetClass="entr" presetSubtype="0" fill="hold" grpId="0" nodeType="clickEffect">
+                                  <p:stCondLst>
+                                    <p:cond delay="0"/>
+                                  </p:stCondLst>
+                                  <p:childTnLst>
+                                    <p:set>
+                                      <p:cBhvr>
+                                        <p:cTn id="18" dur="1" fill="hold">
+                                          <p:stCondLst>
+                                            <p:cond delay="0"/>
+                                          </p:stCondLst>
+                                        </p:cTn>
+                                        <p:tgtEl>
+                                          <p:spTgt spid="5">
+                                            <p:txEl>
+                                              <p:pRg st="3" end="3"/>
+                                            </p:txEl>
+                                          </p:spTgt>
+                                        </p:tgtEl>
+                                        <p:attrNameLst>
+                                          <p:attrName>style.visibility</p:attrName>
+                                        </p:attrNameLst>
+                                      </p:cBhvr>
+                                      <p:to>
+                                        <p:strVal val="visible"/>
+                                      </p:to>
+                                    </p:set>
+                                  </p:childTnLst>
+                                </p:cTn>
+                              </p:par>
+                            </p:childTnLst>
+                          </p:cTn>
+                        </p:par>
+                      </p:childTnLst>
+                    </p:cTn>
+                  </p:par>
+                  <p:par>
+                    <p:cTn id="19" fill="hold">
+                      <p:stCondLst>
+                        <p:cond delay="indefinite"/>
+                      </p:stCondLst>
+                      <p:childTnLst>
+                        <p:par>
+                          <p:cTn id="20" fill="hold">
+                            <p:stCondLst>
+                              <p:cond delay="0"/>
+                            </p:stCondLst>
+                            <p:childTnLst>
+                              <p:par>
+                                <p:cTn id="21" presetID="1" presetClass="entr" presetSubtype="0" fill="hold" grpId="0" nodeType="clickEffect">
+                                  <p:stCondLst>
+                                    <p:cond delay="0"/>
+                                  </p:stCondLst>
+                                  <p:childTnLst>
+                                    <p:set>
+                                      <p:cBhvr>
+                                        <p:cTn id="22" dur="1" fill="hold">
+                                          <p:stCondLst>
+                                            <p:cond delay="0"/>
+                                          </p:stCondLst>
+                                        </p:cTn>
+                                        <p:tgtEl>
+                                          <p:spTgt spid="5">
+                                            <p:txEl>
+                                              <p:pRg st="4" end="4"/>
+                                            </p:txEl>
+                                          </p:spTgt>
+                                        </p:tgtEl>
+                                        <p:attrNameLst>
+                                          <p:attrName>style.visibility</p:attrName>
+                                        </p:attrNameLst>
+                                      </p:cBhvr>
+                                      <p:to>
+                                        <p:strVal val="visible"/>
+                                      </p:to>
+                                    </p:set>
+                                  </p:childTnLst>
+                                </p:cTn>
+                              </p:par>
+                            </p:childTnLst>
+                          </p:cTn>
+                        </p:par>
+                      </p:childTnLst>
+                    </p:cTn>
+                  </p:par>
+                  <p:par>
+                    <p:cTn id="23" fill="hold">
+                      <p:stCondLst>
+                        <p:cond delay="indefinite"/>
+                      </p:stCondLst>
+                      <p:childTnLst>
+                        <p:par>
+                          <p:cTn id="24" fill="hold">
+                            <p:stCondLst>
+                              <p:cond delay="0"/>
+                            </p:stCondLst>
+                            <p:childTnLst>
+                              <p:par>
+                                <p:cTn id="25" presetID="1" presetClass="entr" presetSubtype="0" fill="hold" grpId="0" nodeType="clickEffect">
+                                  <p:stCondLst>
+                                    <p:cond delay="0"/>
+                                  </p:stCondLst>
+                                  <p:childTnLst>
+                                    <p:set>
+                                      <p:cBhvr>
+                                        <p:cTn id="26" dur="1" fill="hold">
+                                          <p:stCondLst>
+                                            <p:cond delay="0"/>
+                                          </p:stCondLst>
+                                        </p:cTn>
+                                        <p:tgtEl>
+                                          <p:spTgt spid="5">
+                                            <p:txEl>
+                                              <p:pRg st="5" end="5"/>
+                                            </p:txEl>
+                                          </p:spTgt>
+                                        </p:tgtEl>
+                                        <p:attrNameLst>
+                                          <p:attrName>style.visibility</p:attrName>
+                                        </p:attrNameLst>
+                                      </p:cBhvr>
+                                      <p:to>
+                                        <p:strVal val="visible"/>
+                                      </p:to>
+                                    </p:set>
+                                  </p:childTnLst>
+                                </p:cTn>
+                              </p:par>
+                            </p:childTnLst>
+                          </p:cTn>
+                        </p:par>
+                      </p:childTnLst>
+                    </p:cTn>
+                  </p:par>
+                  <p:par>
+                    <p:cTn id="27" fill="hold">
+                      <p:stCondLst>
+                        <p:cond delay="indefinite"/>
+                      </p:stCondLst>
+                      <p:childTnLst>
+                        <p:par>
+                          <p:cTn id="28" fill="hold">
+                            <p:stCondLst>
+                              <p:cond delay="0"/>
+                            </p:stCondLst>
+                            <p:childTnLst>
+                              <p:par>
+                                <p:cTn id="29" presetID="1" presetClass="entr" presetSubtype="0" fill="hold" grpId="0" nodeType="clickEffect">
+                                  <p:stCondLst>
+                                    <p:cond delay="0"/>
+                                  </p:stCondLst>
+                                  <p:childTnLst>
+                                    <p:set>
+                                      <p:cBhvr>
+                                        <p:cTn id="30" dur="1" fill="hold">
+                                          <p:stCondLst>
+                                            <p:cond delay="0"/>
+                                          </p:stCondLst>
+                                        </p:cTn>
+                                        <p:tgtEl>
+                                          <p:spTgt spid="5">
+                                            <p:txEl>
+                                              <p:pRg st="6" end="6"/>
+                                            </p:txEl>
+                                          </p:spTgt>
+                                        </p:tgtEl>
+                                        <p:attrNameLst>
+                                          <p:attrName>style.visibility</p:attrName>
+                                        </p:attrNameLst>
+                                      </p:cBhvr>
+                                      <p:to>
+                                        <p:strVal val="visible"/>
+                                      </p:to>
+                                    </p:set>
+                                  </p:childTnLst>
+                                </p:cTn>
+                              </p:par>
+                            </p:childTnLst>
+                          </p:cTn>
+                        </p:par>
+                      </p:childTnLst>
+                    </p:cTn>
+                  </p:par>
+                  <p:par>
+                    <p:cTn id="31" fill="hold">
+                      <p:stCondLst>
+                        <p:cond delay="indefinite"/>
+                      </p:stCondLst>
+                      <p:childTnLst>
+                        <p:par>
+                          <p:cTn id="32" fill="hold">
+                            <p:stCondLst>
+                              <p:cond delay="0"/>
+                            </p:stCondLst>
+                            <p:childTnLst>
+                              <p:par>
+                                <p:cTn id="33" presetID="1" presetClass="exit" presetSubtype="0" fill="hold" grpId="0" nodeType="clickEffect">
+                                  <p:stCondLst>
+                                    <p:cond delay="0"/>
+                                  </p:stCondLst>
+                                  <p:childTnLst>
+                                    <p:set>
+                                      <p:cBhvr>
+                                        <p:cTn id="34" dur="1" fill="hold">
+                                          <p:stCondLst>
+                                            <p:cond delay="0"/>
+                                          </p:stCondLst>
+                                        </p:cTn>
+                                        <p:tgtEl>
+                                          <p:spTgt spid="7"/>
+                                        </p:tgtEl>
+                                        <p:attrNameLst>
+                                          <p:attrName>style.visibility</p:attrName>
+                                        </p:attrNameLst>
+                                      </p:cBhvr>
+                                      <p:to>
+                                        <p:strVal val="hidden"/>
+                                      </p:to>
+                                    </p:set>
+                                  </p:childTnLst>
+                                </p:cTn>
+                              </p:par>
+                            </p:childTnLst>
+                          </p:cTn>
+                        </p:par>
+                      </p:childTnLst>
+                    </p:cTn>
+                  </p:par>
+                  <p:par>
+                    <p:cTn id="35" fill="hold">
+                      <p:stCondLst>
+                        <p:cond delay="indefinite"/>
+                      </p:stCondLst>
+                      <p:childTnLst>
+                        <p:par>
+                          <p:cTn id="36" fill="hold">
+                            <p:stCondLst>
+                              <p:cond delay="0"/>
+                            </p:stCondLst>
+                            <p:childTnLst>
+                              <p:par>
+                                <p:cTn id="37" presetID="1" presetClass="entr" presetSubtype="0" fill="hold" grpId="0" nodeType="clickEffect">
+                                  <p:stCondLst>
+                                    <p:cond delay="0"/>
+                                  </p:stCondLst>
+                                  <p:childTnLst>
+                                    <p:set>
+                                      <p:cBhvr>
+                                        <p:cTn id="38" dur="1" fill="hold">
+                                          <p:stCondLst>
+                                            <p:cond delay="0"/>
+                                          </p:stCondLst>
+                                        </p:cTn>
+                                        <p:tgtEl>
+                                          <p:spTgt spid="5">
+                                            <p:txEl>
+                                              <p:pRg st="7" end="7"/>
+                                            </p:txEl>
+                                          </p:spTgt>
+                                        </p:tgtEl>
+                                        <p:attrNameLst>
+                                          <p:attrName>style.visibility</p:attrName>
+                                        </p:attrNameLst>
+                                      </p:cBhvr>
+                                      <p:to>
+                                        <p:strVal val="visible"/>
+                                      </p:to>
+                                    </p:set>
+                                  </p:childTnLst>
+                                </p:cTn>
+                              </p:par>
+                            </p:childTnLst>
+                          </p:cTn>
+                        </p:par>
+                      </p:childTnLst>
+                    </p:cTn>
+                  </p:par>
+                  <p:par>
+                    <p:cTn id="39" fill="hold">
+                      <p:stCondLst>
+                        <p:cond delay="indefinite"/>
+                      </p:stCondLst>
+                      <p:childTnLst>
+                        <p:par>
+                          <p:cTn id="40" fill="hold">
+                            <p:stCondLst>
+                              <p:cond delay="0"/>
+                            </p:stCondLst>
+                            <p:childTnLst>
+                              <p:par>
+                                <p:cTn id="41" presetID="1" presetClass="entr" presetSubtype="0" fill="hold" grpId="0" nodeType="clickEffect">
+                                  <p:stCondLst>
+                                    <p:cond delay="0"/>
+                                  </p:stCondLst>
+                                  <p:childTnLst>
+                                    <p:set>
+                                      <p:cBhvr>
+                                        <p:cTn id="42" dur="1" fill="hold">
+                                          <p:stCondLst>
+                                            <p:cond delay="0"/>
+                                          </p:stCondLst>
+                                        </p:cTn>
+                                        <p:tgtEl>
+                                          <p:spTgt spid="5">
+                                            <p:txEl>
+                                              <p:pRg st="8" end="8"/>
+                                            </p:txEl>
+                                          </p:spTgt>
+                                        </p:tgtEl>
+                                        <p:attrNameLst>
+                                          <p:attrName>style.visibility</p:attrName>
+                                        </p:attrNameLst>
+                                      </p:cBhvr>
+                                      <p:to>
+                                        <p:strVal val="visible"/>
+                                      </p:to>
+                                    </p:set>
+                                  </p:childTnLst>
+                                </p:cTn>
+                              </p:par>
+                            </p:childTnLst>
+                          </p:cTn>
+                        </p:par>
+                      </p:childTnLst>
+                    </p:cTn>
+                  </p:par>
+                  <p:par>
+                    <p:cTn id="43" fill="hold">
+                      <p:stCondLst>
+                        <p:cond delay="indefinite"/>
+                      </p:stCondLst>
+                      <p:childTnLst>
+                        <p:par>
+                          <p:cTn id="44" fill="hold">
+                            <p:stCondLst>
+                              <p:cond delay="0"/>
+                            </p:stCondLst>
+                            <p:childTnLst>
+                              <p:par>
+                                <p:cTn id="45" presetID="1" presetClass="entr" presetSubtype="0" fill="hold" grpId="0" nodeType="clickEffect">
+                                  <p:stCondLst>
+                                    <p:cond delay="0"/>
+                                  </p:stCondLst>
+                                  <p:childTnLst>
+                                    <p:set>
+                                      <p:cBhvr>
+                                        <p:cTn id="46" dur="1" fill="hold">
+                                          <p:stCondLst>
+                                            <p:cond delay="0"/>
+                                          </p:stCondLst>
+                                        </p:cTn>
+                                        <p:tgtEl>
+                                          <p:spTgt spid="5">
+                                            <p:txEl>
+                                              <p:pRg st="9" end="9"/>
+                                            </p:txEl>
+                                          </p:spTgt>
+                                        </p:tgtEl>
+                                        <p:attrNameLst>
+                                          <p:attrName>style.visibility</p:attrName>
+                                        </p:attrNameLst>
+                                      </p:cBhvr>
+                                      <p:to>
+                                        <p:strVal val="visible"/>
+                                      </p:to>
+                                    </p:set>
+                                  </p:childTnLst>
+                                </p:cTn>
+                              </p:par>
+                            </p:childTnLst>
+                          </p:cTn>
+                        </p:par>
+                      </p:childTnLst>
+                    </p:cTn>
+                  </p:par>
+                  <p:par>
+                    <p:cTn id="47" fill="hold">
+                      <p:stCondLst>
+                        <p:cond delay="indefinite"/>
+                      </p:stCondLst>
+                      <p:childTnLst>
+                        <p:par>
+                          <p:cTn id="48" fill="hold">
+                            <p:stCondLst>
+                              <p:cond delay="0"/>
+                            </p:stCondLst>
+                            <p:childTnLst>
+                              <p:par>
+                                <p:cTn id="49" presetID="1" presetClass="entr" presetSubtype="0" fill="hold" grpId="0" nodeType="clickEffect">
+                                  <p:stCondLst>
+                                    <p:cond delay="0"/>
+                                  </p:stCondLst>
+                                  <p:childTnLst>
+                                    <p:set>
+                                      <p:cBhvr>
+                                        <p:cTn id="50" dur="1" fill="hold">
+                                          <p:stCondLst>
+                                            <p:cond delay="0"/>
+                                          </p:stCondLst>
+                                        </p:cTn>
+                                        <p:tgtEl>
+                                          <p:spTgt spid="5">
+                                            <p:txEl>
+                                              <p:pRg st="10" end="10"/>
+                                            </p:txEl>
+                                          </p:spTgt>
+                                        </p:tgtEl>
+                                        <p:attrNameLst>
+                                          <p:attrName>style.visibility</p:attrName>
+                                        </p:attrNameLst>
+                                      </p:cBhvr>
+                                      <p:to>
+                                        <p:strVal val="visible"/>
+                                      </p:to>
+                                    </p:set>
+                                  </p:childTnLst>
+                                </p:cTn>
+                              </p:par>
+                            </p:childTnLst>
+                          </p:cTn>
+                        </p:par>
+                      </p:childTnLst>
+                    </p:cTn>
+                  </p:par>
+                </p:childTnLst>
+              </p:cTn>
+              <p:prevCondLst>
+                <p:cond evt="onPrev" delay="0">
+                  <p:tgtEl>
+                    <p:sldTgt/>
+                  </p:tgtEl>
+                </p:cond>
+              </p:prevCondLst>
+              <p:nextCondLst>
+                <p:cond evt="onNext" delay="0">
+                  <p:tgtEl>
+                    <p:sldTgt/>
+                  </p:tgtEl>
+                </p:cond>
+              </p:nextCondLst>
+            </p:seq>
+          </p:childTnLst>
+        </p:cTn>
       </p:par>
     </p:tnLst>
+    <p:bldLst>
+      <p:bldP spid="5" grpId="0" uiExpand="1" build="p"/>
+      <p:bldP spid="7" grpId="0" animBg="1"/>
+    </p:bldLst>
   </p:timing>
 </p:sld>
 </file>
@@ -4017,8 +4961,8 @@
           <a:lstStyle/>
           <a:p>
             <a:r>
-              <a:rPr lang="en-US" dirty="0" smtClean="0"/>
-              <a:t>Graph-DB Concepts</a:t>
+              <a:rPr lang="de-AT" dirty="0" smtClean="0"/>
+              <a:t>Unicode and CSV</a:t>
             </a:r>
             <a:endParaRPr lang="de-AT" dirty="0"/>
           </a:p>
@@ -4031,162 +4975,279 @@
             <a:spLocks noGrp="1"/>
           </p:cNvSpPr>
           <p:nvPr>
-            <p:ph sz="half" idx="1"/>
+            <p:ph idx="1"/>
           </p:nvPr>
         </p:nvSpPr>
         <p:spPr/>
         <p:txBody>
-          <a:bodyPr/>
+          <a:bodyPr>
+            <a:normAutofit lnSpcReduction="10000"/>
+          </a:bodyPr>
           <a:lstStyle/>
           <a:p>
             <a:r>
-              <a:rPr lang="en-US" dirty="0" smtClean="0"/>
-              <a:t>Ideas</a:t>
-            </a:r>
-          </a:p>
-          <a:p>
-            <a:pPr lvl="1"/>
-            <a:r>
-              <a:rPr lang="en-US" dirty="0" smtClean="0"/>
-              <a:t>RDBMS: Slow Joins</a:t>
-            </a:r>
-          </a:p>
-          <a:p>
-            <a:pPr lvl="1"/>
-            <a:r>
-              <a:rPr lang="en-US" dirty="0" smtClean="0"/>
-              <a:t>Natural Relations</a:t>
-            </a:r>
-          </a:p>
-          <a:p>
-            <a:pPr lvl="1"/>
-            <a:r>
-              <a:rPr lang="en-US" dirty="0" smtClean="0"/>
-              <a:t>Graph Theory (math)</a:t>
-            </a:r>
-          </a:p>
-          <a:p>
-            <a:endParaRPr lang="en-US" dirty="0" smtClean="0"/>
-          </a:p>
-          <a:p>
-            <a:r>
-              <a:rPr lang="en-US" dirty="0" smtClean="0"/>
-              <a:t>Components</a:t>
-            </a:r>
-            <a:endParaRPr lang="en-US" dirty="0"/>
-          </a:p>
-          <a:p>
-            <a:pPr lvl="1"/>
-            <a:r>
-              <a:rPr lang="en-US" dirty="0" smtClean="0"/>
-              <a:t>Nodes (Entities)</a:t>
-            </a:r>
-          </a:p>
-          <a:p>
-            <a:pPr lvl="1"/>
-            <a:r>
-              <a:rPr lang="en-US" dirty="0" smtClean="0"/>
-              <a:t>Edges (Relationships)</a:t>
-            </a:r>
-          </a:p>
-          <a:p>
-            <a:pPr lvl="1"/>
-            <a:r>
-              <a:rPr lang="en-US" dirty="0" smtClean="0"/>
-              <a:t>Properties (Data)</a:t>
-            </a:r>
-          </a:p>
-          <a:p>
-            <a:endParaRPr lang="de-AT" dirty="0"/>
+              <a:rPr lang="de-AT" dirty="0" smtClean="0"/>
+              <a:t>What‘s wrong with this code?</a:t>
+            </a:r>
+            <a:r>
+              <a:rPr lang="de-DE" altLang="de-DE" sz="2000" dirty="0" smtClean="0">
+                <a:solidFill>
+                  <a:srgbClr val="000000"/>
+                </a:solidFill>
+                <a:latin typeface="Consolas" panose="020B0609020204030204" pitchFamily="49" charset="0"/>
+                <a:cs typeface="Consolas" panose="020B0609020204030204" pitchFamily="49" charset="0"/>
+              </a:rPr>
+              <a:t/>
+            </a:r>
+            <a:br>
+              <a:rPr lang="de-DE" altLang="de-DE" sz="2000" dirty="0" smtClean="0">
+                <a:solidFill>
+                  <a:srgbClr val="000000"/>
+                </a:solidFill>
+                <a:latin typeface="Consolas" panose="020B0609020204030204" pitchFamily="49" charset="0"/>
+                <a:cs typeface="Consolas" panose="020B0609020204030204" pitchFamily="49" charset="0"/>
+              </a:rPr>
+            </a:br>
+            <a:r>
+              <a:rPr lang="de-DE" altLang="de-DE" sz="1000" dirty="0" smtClean="0">
+                <a:solidFill>
+                  <a:srgbClr val="000000"/>
+                </a:solidFill>
+                <a:latin typeface="Consolas" panose="020B0609020204030204" pitchFamily="49" charset="0"/>
+                <a:cs typeface="Consolas" panose="020B0609020204030204" pitchFamily="49" charset="0"/>
+              </a:rPr>
+              <a:t/>
+            </a:r>
+            <a:br>
+              <a:rPr lang="de-DE" altLang="de-DE" sz="1000" dirty="0" smtClean="0">
+                <a:solidFill>
+                  <a:srgbClr val="000000"/>
+                </a:solidFill>
+                <a:latin typeface="Consolas" panose="020B0609020204030204" pitchFamily="49" charset="0"/>
+                <a:cs typeface="Consolas" panose="020B0609020204030204" pitchFamily="49" charset="0"/>
+              </a:rPr>
+            </a:br>
+            <a:r>
+              <a:rPr lang="de-DE" altLang="de-DE" sz="2000" dirty="0" smtClean="0">
+                <a:solidFill>
+                  <a:srgbClr val="0000FF"/>
+                </a:solidFill>
+                <a:latin typeface="Consolas" panose="020B0609020204030204" pitchFamily="49" charset="0"/>
+                <a:cs typeface="Consolas" panose="020B0609020204030204" pitchFamily="49" charset="0"/>
+              </a:rPr>
+              <a:t>var</a:t>
+            </a:r>
+            <a:r>
+              <a:rPr lang="de-DE" altLang="de-DE" sz="2000" dirty="0">
+                <a:solidFill>
+                  <a:srgbClr val="000000"/>
+                </a:solidFill>
+                <a:latin typeface="Consolas" panose="020B0609020204030204" pitchFamily="49" charset="0"/>
+                <a:cs typeface="Consolas" panose="020B0609020204030204" pitchFamily="49" charset="0"/>
+              </a:rPr>
+              <a:t> t = page.Text.Substring(0, 100</a:t>
+            </a:r>
+            <a:r>
+              <a:rPr lang="de-DE" altLang="de-DE" sz="2000" dirty="0" smtClean="0">
+                <a:solidFill>
+                  <a:srgbClr val="000000"/>
+                </a:solidFill>
+                <a:latin typeface="Consolas" panose="020B0609020204030204" pitchFamily="49" charset="0"/>
+                <a:cs typeface="Consolas" panose="020B0609020204030204" pitchFamily="49" charset="0"/>
+              </a:rPr>
+              <a:t>);</a:t>
+            </a:r>
+            <a:r>
+              <a:rPr lang="de-DE" altLang="de-DE" sz="2000" dirty="0">
+                <a:solidFill>
+                  <a:srgbClr val="000000"/>
+                </a:solidFill>
+                <a:latin typeface="Consolas" panose="020B0609020204030204" pitchFamily="49" charset="0"/>
+                <a:cs typeface="Consolas" panose="020B0609020204030204" pitchFamily="49" charset="0"/>
+              </a:rPr>
+              <a:t/>
+            </a:r>
+            <a:br>
+              <a:rPr lang="de-DE" altLang="de-DE" sz="2000" dirty="0">
+                <a:solidFill>
+                  <a:srgbClr val="000000"/>
+                </a:solidFill>
+                <a:latin typeface="Consolas" panose="020B0609020204030204" pitchFamily="49" charset="0"/>
+                <a:cs typeface="Consolas" panose="020B0609020204030204" pitchFamily="49" charset="0"/>
+              </a:rPr>
+            </a:br>
+            <a:r>
+              <a:rPr lang="de-DE" altLang="de-DE" sz="2000" dirty="0">
+                <a:solidFill>
+                  <a:srgbClr val="000000"/>
+                </a:solidFill>
+                <a:latin typeface="Consolas" panose="020B0609020204030204" pitchFamily="49" charset="0"/>
+                <a:cs typeface="Consolas" panose="020B0609020204030204" pitchFamily="49" charset="0"/>
+              </a:rPr>
+              <a:t>writer.WriteLine(t</a:t>
+            </a:r>
+            <a:r>
+              <a:rPr lang="de-DE" altLang="de-DE" sz="2000" dirty="0" smtClean="0">
+                <a:solidFill>
+                  <a:srgbClr val="000000"/>
+                </a:solidFill>
+                <a:latin typeface="Consolas" panose="020B0609020204030204" pitchFamily="49" charset="0"/>
+                <a:cs typeface="Consolas" panose="020B0609020204030204" pitchFamily="49" charset="0"/>
+              </a:rPr>
+              <a:t>);</a:t>
+            </a:r>
+            <a:br>
+              <a:rPr lang="de-DE" altLang="de-DE" sz="2000" dirty="0" smtClean="0">
+                <a:solidFill>
+                  <a:srgbClr val="000000"/>
+                </a:solidFill>
+                <a:latin typeface="Consolas" panose="020B0609020204030204" pitchFamily="49" charset="0"/>
+                <a:cs typeface="Consolas" panose="020B0609020204030204" pitchFamily="49" charset="0"/>
+              </a:rPr>
+            </a:br>
+            <a:endParaRPr lang="de-DE" altLang="de-DE" sz="1000" dirty="0">
+              <a:latin typeface="Arial" panose="020B0604020202020204" pitchFamily="34" charset="0"/>
+            </a:endParaRPr>
+          </a:p>
+          <a:p>
+            <a:r>
+              <a:rPr lang="de-AT" dirty="0" smtClean="0"/>
+              <a:t>Varchar vs. nvarchar</a:t>
+            </a:r>
+            <a:endParaRPr lang="de-AT" dirty="0" smtClean="0"/>
+          </a:p>
+          <a:p>
+            <a:r>
+              <a:rPr lang="de-AT" dirty="0" smtClean="0"/>
+              <a:t>MS SQL Server: no UTF8</a:t>
+            </a:r>
+            <a:br>
+              <a:rPr lang="de-AT" dirty="0" smtClean="0"/>
+            </a:br>
+            <a:r>
+              <a:rPr lang="de-AT" dirty="0" smtClean="0"/>
+              <a:t>N</a:t>
+            </a:r>
+            <a:r>
+              <a:rPr lang="de-AT" dirty="0" smtClean="0"/>
+              <a:t>eo4j: only UTF8</a:t>
+            </a:r>
+          </a:p>
+          <a:p>
+            <a:r>
+              <a:rPr lang="de-AT" dirty="0" smtClean="0"/>
+              <a:t>MS SQL CSV: no enquoted fields, no field interpretation</a:t>
+            </a:r>
+            <a:br>
+              <a:rPr lang="de-AT" dirty="0" smtClean="0"/>
+            </a:br>
+            <a:r>
+              <a:rPr lang="de-AT" dirty="0" smtClean="0"/>
+              <a:t>Neo4j CSV: enquoting optional, requires escapting quotes</a:t>
+            </a:r>
+          </a:p>
+          <a:p>
+            <a:r>
+              <a:rPr lang="de-AT" dirty="0" smtClean="0"/>
+              <a:t>String equality</a:t>
+            </a:r>
+            <a:br>
+              <a:rPr lang="de-AT" dirty="0" smtClean="0"/>
+            </a:br>
+            <a:r>
+              <a:rPr lang="de-AT" sz="2000" dirty="0" smtClean="0">
+                <a:solidFill>
+                  <a:srgbClr val="000000"/>
+                </a:solidFill>
+                <a:latin typeface="Consolas" panose="020B0609020204030204" pitchFamily="49" charset="0"/>
+                <a:cs typeface="Consolas" panose="020B0609020204030204" pitchFamily="49" charset="0"/>
+              </a:rPr>
+              <a:t>WHERE </a:t>
+            </a:r>
+            <a:r>
+              <a:rPr lang="de-AT" sz="2000" dirty="0">
+                <a:solidFill>
+                  <a:srgbClr val="000000"/>
+                </a:solidFill>
+                <a:latin typeface="Consolas" panose="020B0609020204030204" pitchFamily="49" charset="0"/>
+                <a:cs typeface="Consolas" panose="020B0609020204030204" pitchFamily="49" charset="0"/>
+              </a:rPr>
+              <a:t>str1 = str2 COLLATE ..._BIN</a:t>
+            </a:r>
+            <a:endParaRPr lang="de-AT" sz="2000" dirty="0">
+              <a:solidFill>
+                <a:srgbClr val="000000"/>
+              </a:solidFill>
+              <a:latin typeface="Consolas" panose="020B0609020204030204" pitchFamily="49" charset="0"/>
+              <a:cs typeface="Consolas" panose="020B0609020204030204" pitchFamily="49" charset="0"/>
+            </a:endParaRPr>
           </a:p>
         </p:txBody>
       </p:sp>
       <p:pic>
         <p:nvPicPr>
-          <p:cNvPr id="2050" name="Picture 2" descr="from relational model"/>
+          <p:cNvPr id="4" name="Content Placeholder 3"/>
           <p:cNvPicPr>
-            <a:picLocks noChangeAspect="1" noChangeArrowheads="1"/>
+            <a:picLocks noChangeAspect="1"/>
           </p:cNvPicPr>
           <p:nvPr/>
         </p:nvPicPr>
         <p:blipFill>
-          <a:blip r:embed="rId2" cstate="print">
+          <a:blip r:embed="rId2">
             <a:extLst>
               <a:ext uri="{28A0092B-C50C-407E-A947-70E740481C1C}">
                 <a14:useLocalDpi xmlns:a14="http://schemas.microsoft.com/office/drawing/2010/main" val="0"/>
               </a:ext>
             </a:extLst>
           </a:blip>
-          <a:srcRect/>
           <a:stretch>
             <a:fillRect/>
           </a:stretch>
         </p:blipFill>
-        <p:spPr bwMode="auto">
+        <p:spPr>
           <a:xfrm>
-            <a:off x="7624284" y="574991"/>
-            <a:ext cx="3809198" cy="2019642"/>
+            <a:off x="6659259" y="1027905"/>
+            <a:ext cx="4694541" cy="2491471"/>
           </a:xfrm>
           <a:prstGeom prst="rect">
             <a:avLst/>
           </a:prstGeom>
-          <a:noFill/>
-          <a:extLst>
-            <a:ext uri="{909E8E84-426E-40DD-AFC4-6F175D3DCCD1}">
-              <a14:hiddenFill xmlns:a14="http://schemas.microsoft.com/office/drawing/2010/main">
-                <a:solidFill>
-                  <a:srgbClr val="FFFFFF"/>
-                </a:solidFill>
-              </a14:hiddenFill>
-            </a:ext>
-          </a:extLst>
-        </p:spPr>
-      </p:pic>
-      <p:pic>
-        <p:nvPicPr>
-          <p:cNvPr id="2052" name="Picture 4" descr="to graph model"/>
-          <p:cNvPicPr>
-            <a:picLocks noChangeAspect="1" noChangeArrowheads="1"/>
-          </p:cNvPicPr>
-          <p:nvPr/>
-        </p:nvPicPr>
-        <p:blipFill>
-          <a:blip r:embed="rId3">
-            <a:extLst>
-              <a:ext uri="{28A0092B-C50C-407E-A947-70E740481C1C}">
-                <a14:useLocalDpi xmlns:a14="http://schemas.microsoft.com/office/drawing/2010/main" val="0"/>
-              </a:ext>
-            </a:extLst>
-          </a:blip>
-          <a:srcRect/>
-          <a:stretch>
-            <a:fillRect/>
-          </a:stretch>
-        </p:blipFill>
-        <p:spPr bwMode="auto">
-          <a:xfrm>
-            <a:off x="5880756" y="2461335"/>
-            <a:ext cx="5552726" cy="3850565"/>
-          </a:xfrm>
-          <a:prstGeom prst="rect">
-            <a:avLst/>
-          </a:prstGeom>
-          <a:noFill/>
-          <a:extLst>
-            <a:ext uri="{909E8E84-426E-40DD-AFC4-6F175D3DCCD1}">
-              <a14:hiddenFill xmlns:a14="http://schemas.microsoft.com/office/drawing/2010/main">
-                <a:solidFill>
-                  <a:srgbClr val="FFFFFF"/>
-                </a:solidFill>
-              </a14:hiddenFill>
-            </a:ext>
-          </a:extLst>
+          <a:solidFill>
+            <a:srgbClr val="FFFFFF">
+              <a:shade val="85000"/>
+            </a:srgbClr>
+          </a:solidFill>
+          <a:ln w="88900" cap="sq">
+            <a:solidFill>
+              <a:srgbClr val="FFFFFF"/>
+            </a:solidFill>
+            <a:miter lim="800000"/>
+          </a:ln>
+          <a:effectLst>
+            <a:outerShdw blurRad="55000" dist="18000" dir="5400000" algn="tl" rotWithShape="0">
+              <a:srgbClr val="000000">
+                <a:alpha val="40000"/>
+              </a:srgbClr>
+            </a:outerShdw>
+          </a:effectLst>
+          <a:scene3d>
+            <a:camera prst="orthographicFront"/>
+            <a:lightRig rig="twoPt" dir="t">
+              <a:rot lat="0" lon="0" rev="7200000"/>
+            </a:lightRig>
+          </a:scene3d>
+          <a:sp3d>
+            <a:bevelT w="25400" h="19050"/>
+            <a:contourClr>
+              <a:srgbClr val="FFFFFF"/>
+            </a:contourClr>
+          </a:sp3d>
         </p:spPr>
       </p:pic>
     </p:spTree>
     <p:extLst>
       <p:ext uri="{BB962C8B-B14F-4D97-AF65-F5344CB8AC3E}">
-        <p14:creationId xmlns:p14="http://schemas.microsoft.com/office/powerpoint/2010/main" val="3490408120"/>
+        <p14:creationId xmlns:p14="http://schemas.microsoft.com/office/powerpoint/2010/main" val="975691752"/>
       </p:ext>
     </p:extLst>
   </p:cSld>
@@ -4196,9 +5257,283 @@
   <p:timing>
     <p:tnLst>
       <p:par>
-        <p:cTn id="1" dur="indefinite" restart="never" nodeType="tmRoot"/>
+        <p:cTn id="1" dur="indefinite" restart="never" nodeType="tmRoot">
+          <p:childTnLst>
+            <p:seq concurrent="1" nextAc="seek">
+              <p:cTn id="2" dur="indefinite" nodeType="mainSeq">
+                <p:childTnLst>
+                  <p:par>
+                    <p:cTn id="3" fill="hold">
+                      <p:stCondLst>
+                        <p:cond delay="indefinite"/>
+                        <p:cond evt="onBegin" delay="0">
+                          <p:tn val="2"/>
+                        </p:cond>
+                      </p:stCondLst>
+                      <p:childTnLst>
+                        <p:par>
+                          <p:cTn id="4" fill="hold">
+                            <p:stCondLst>
+                              <p:cond delay="0"/>
+                            </p:stCondLst>
+                            <p:childTnLst>
+                              <p:par>
+                                <p:cTn id="5" presetID="1" presetClass="entr" presetSubtype="0" fill="hold" grpId="0" nodeType="withEffect">
+                                  <p:stCondLst>
+                                    <p:cond delay="0"/>
+                                  </p:stCondLst>
+                                  <p:childTnLst>
+                                    <p:set>
+                                      <p:cBhvr>
+                                        <p:cTn id="6" dur="1" fill="hold">
+                                          <p:stCondLst>
+                                            <p:cond delay="0"/>
+                                          </p:stCondLst>
+                                        </p:cTn>
+                                        <p:tgtEl>
+                                          <p:spTgt spid="3">
+                                            <p:txEl>
+                                              <p:pRg st="0" end="0"/>
+                                            </p:txEl>
+                                          </p:spTgt>
+                                        </p:tgtEl>
+                                        <p:attrNameLst>
+                                          <p:attrName>style.visibility</p:attrName>
+                                        </p:attrNameLst>
+                                      </p:cBhvr>
+                                      <p:to>
+                                        <p:strVal val="visible"/>
+                                      </p:to>
+                                    </p:set>
+                                  </p:childTnLst>
+                                </p:cTn>
+                              </p:par>
+                            </p:childTnLst>
+                          </p:cTn>
+                        </p:par>
+                      </p:childTnLst>
+                    </p:cTn>
+                  </p:par>
+                  <p:par>
+                    <p:cTn id="7" fill="hold">
+                      <p:stCondLst>
+                        <p:cond delay="indefinite"/>
+                      </p:stCondLst>
+                      <p:childTnLst>
+                        <p:par>
+                          <p:cTn id="8" fill="hold">
+                            <p:stCondLst>
+                              <p:cond delay="0"/>
+                            </p:stCondLst>
+                            <p:childTnLst>
+                              <p:par>
+                                <p:cTn id="9" presetID="1" presetClass="entr" presetSubtype="0" fill="hold" grpId="0" nodeType="clickEffect">
+                                  <p:stCondLst>
+                                    <p:cond delay="0"/>
+                                  </p:stCondLst>
+                                  <p:childTnLst>
+                                    <p:set>
+                                      <p:cBhvr>
+                                        <p:cTn id="10" dur="1" fill="hold">
+                                          <p:stCondLst>
+                                            <p:cond delay="0"/>
+                                          </p:stCondLst>
+                                        </p:cTn>
+                                        <p:tgtEl>
+                                          <p:spTgt spid="3">
+                                            <p:txEl>
+                                              <p:pRg st="1" end="1"/>
+                                            </p:txEl>
+                                          </p:spTgt>
+                                        </p:tgtEl>
+                                        <p:attrNameLst>
+                                          <p:attrName>style.visibility</p:attrName>
+                                        </p:attrNameLst>
+                                      </p:cBhvr>
+                                      <p:to>
+                                        <p:strVal val="visible"/>
+                                      </p:to>
+                                    </p:set>
+                                  </p:childTnLst>
+                                </p:cTn>
+                              </p:par>
+                            </p:childTnLst>
+                          </p:cTn>
+                        </p:par>
+                      </p:childTnLst>
+                    </p:cTn>
+                  </p:par>
+                  <p:par>
+                    <p:cTn id="11" fill="hold">
+                      <p:stCondLst>
+                        <p:cond delay="indefinite"/>
+                      </p:stCondLst>
+                      <p:childTnLst>
+                        <p:par>
+                          <p:cTn id="12" fill="hold">
+                            <p:stCondLst>
+                              <p:cond delay="0"/>
+                            </p:stCondLst>
+                            <p:childTnLst>
+                              <p:par>
+                                <p:cTn id="13" presetID="1" presetClass="entr" presetSubtype="0" fill="hold" grpId="0" nodeType="clickEffect">
+                                  <p:stCondLst>
+                                    <p:cond delay="0"/>
+                                  </p:stCondLst>
+                                  <p:childTnLst>
+                                    <p:set>
+                                      <p:cBhvr>
+                                        <p:cTn id="14" dur="1" fill="hold">
+                                          <p:stCondLst>
+                                            <p:cond delay="0"/>
+                                          </p:stCondLst>
+                                        </p:cTn>
+                                        <p:tgtEl>
+                                          <p:spTgt spid="3">
+                                            <p:txEl>
+                                              <p:pRg st="2" end="2"/>
+                                            </p:txEl>
+                                          </p:spTgt>
+                                        </p:tgtEl>
+                                        <p:attrNameLst>
+                                          <p:attrName>style.visibility</p:attrName>
+                                        </p:attrNameLst>
+                                      </p:cBhvr>
+                                      <p:to>
+                                        <p:strVal val="visible"/>
+                                      </p:to>
+                                    </p:set>
+                                  </p:childTnLst>
+                                </p:cTn>
+                              </p:par>
+                            </p:childTnLst>
+                          </p:cTn>
+                        </p:par>
+                      </p:childTnLst>
+                    </p:cTn>
+                  </p:par>
+                  <p:par>
+                    <p:cTn id="15" fill="hold">
+                      <p:stCondLst>
+                        <p:cond delay="indefinite"/>
+                      </p:stCondLst>
+                      <p:childTnLst>
+                        <p:par>
+                          <p:cTn id="16" fill="hold">
+                            <p:stCondLst>
+                              <p:cond delay="0"/>
+                            </p:stCondLst>
+                            <p:childTnLst>
+                              <p:par>
+                                <p:cTn id="17" presetID="1" presetClass="entr" presetSubtype="0" fill="hold" grpId="0" nodeType="clickEffect">
+                                  <p:stCondLst>
+                                    <p:cond delay="0"/>
+                                  </p:stCondLst>
+                                  <p:childTnLst>
+                                    <p:set>
+                                      <p:cBhvr>
+                                        <p:cTn id="18" dur="1" fill="hold">
+                                          <p:stCondLst>
+                                            <p:cond delay="0"/>
+                                          </p:stCondLst>
+                                        </p:cTn>
+                                        <p:tgtEl>
+                                          <p:spTgt spid="3">
+                                            <p:txEl>
+                                              <p:pRg st="3" end="3"/>
+                                            </p:txEl>
+                                          </p:spTgt>
+                                        </p:tgtEl>
+                                        <p:attrNameLst>
+                                          <p:attrName>style.visibility</p:attrName>
+                                        </p:attrNameLst>
+                                      </p:cBhvr>
+                                      <p:to>
+                                        <p:strVal val="visible"/>
+                                      </p:to>
+                                    </p:set>
+                                  </p:childTnLst>
+                                </p:cTn>
+                              </p:par>
+                            </p:childTnLst>
+                          </p:cTn>
+                        </p:par>
+                      </p:childTnLst>
+                    </p:cTn>
+                  </p:par>
+                  <p:par>
+                    <p:cTn id="19" fill="hold">
+                      <p:stCondLst>
+                        <p:cond delay="indefinite"/>
+                      </p:stCondLst>
+                      <p:childTnLst>
+                        <p:par>
+                          <p:cTn id="20" fill="hold">
+                            <p:stCondLst>
+                              <p:cond delay="0"/>
+                            </p:stCondLst>
+                            <p:childTnLst>
+                              <p:par>
+                                <p:cTn id="21" presetID="1" presetClass="entr" presetSubtype="0" fill="hold" grpId="0" nodeType="clickEffect">
+                                  <p:stCondLst>
+                                    <p:cond delay="0"/>
+                                  </p:stCondLst>
+                                  <p:childTnLst>
+                                    <p:set>
+                                      <p:cBhvr>
+                                        <p:cTn id="22" dur="1" fill="hold">
+                                          <p:stCondLst>
+                                            <p:cond delay="0"/>
+                                          </p:stCondLst>
+                                        </p:cTn>
+                                        <p:tgtEl>
+                                          <p:spTgt spid="3">
+                                            <p:txEl>
+                                              <p:pRg st="4" end="4"/>
+                                            </p:txEl>
+                                          </p:spTgt>
+                                        </p:tgtEl>
+                                        <p:attrNameLst>
+                                          <p:attrName>style.visibility</p:attrName>
+                                        </p:attrNameLst>
+                                      </p:cBhvr>
+                                      <p:to>
+                                        <p:strVal val="visible"/>
+                                      </p:to>
+                                    </p:set>
+                                  </p:childTnLst>
+                                </p:cTn>
+                              </p:par>
+                            </p:childTnLst>
+                          </p:cTn>
+                        </p:par>
+                      </p:childTnLst>
+                    </p:cTn>
+                  </p:par>
+                </p:childTnLst>
+              </p:cTn>
+              <p:prevCondLst>
+                <p:cond evt="onPrev" delay="0">
+                  <p:tgtEl>
+                    <p:sldTgt/>
+                  </p:tgtEl>
+                </p:cond>
+              </p:prevCondLst>
+              <p:nextCondLst>
+                <p:cond evt="onNext" delay="0">
+                  <p:tgtEl>
+                    <p:sldTgt/>
+                  </p:tgtEl>
+                </p:cond>
+              </p:nextCondLst>
+            </p:seq>
+          </p:childTnLst>
+        </p:cTn>
       </p:par>
     </p:tnLst>
+    <p:bldLst>
+      <p:bldP spid="3" grpId="0" uiExpand="1" build="p"/>
+    </p:bldLst>
   </p:timing>
 </p:sld>
 </file>
@@ -4253,13 +5588,39 @@
             <p:ph sz="half" idx="1"/>
           </p:nvPr>
         </p:nvSpPr>
-        <p:spPr/>
+        <p:spPr>
+          <a:xfrm>
+            <a:off x="838200" y="1825624"/>
+            <a:ext cx="5181600" cy="4692133"/>
+          </a:xfrm>
+        </p:spPr>
         <p:txBody>
           <a:bodyPr/>
           <a:lstStyle/>
           <a:p>
             <a:r>
               <a:rPr lang="en-US" dirty="0" smtClean="0"/>
+              <a:t>Wikipedia English</a:t>
+            </a:r>
+          </a:p>
+          <a:p>
+            <a:pPr lvl="1"/>
+            <a:r>
+              <a:rPr lang="en-US" dirty="0" smtClean="0"/>
+              <a:t>15.113.788 articles</a:t>
+            </a:r>
+          </a:p>
+          <a:p>
+            <a:pPr lvl="1"/>
+            <a:r>
+              <a:rPr lang="en-US" dirty="0" smtClean="0"/>
+              <a:t>164.379.808 links</a:t>
+            </a:r>
+            <a:endParaRPr lang="en-US" dirty="0" smtClean="0"/>
+          </a:p>
+          <a:p>
+            <a:r>
+              <a:rPr lang="en-US" dirty="0" smtClean="0"/>
               <a:t>Wikipedia </a:t>
             </a:r>
             <a:r>
@@ -4272,21 +5633,23 @@
             <a:pPr lvl="1"/>
             <a:r>
               <a:rPr lang="en-US" dirty="0" smtClean="0"/>
-              <a:t>31814 Articles</a:t>
-            </a:r>
+              <a:t>31.814 articles</a:t>
+            </a:r>
+            <a:endParaRPr lang="en-US" dirty="0" smtClean="0"/>
           </a:p>
           <a:p>
             <a:pPr lvl="1"/>
             <a:r>
               <a:rPr lang="en-US" dirty="0" smtClean="0"/>
-              <a:t>299032 Links</a:t>
-            </a:r>
+              <a:t>299.032 links</a:t>
+            </a:r>
+            <a:endParaRPr lang="en-US" dirty="0" smtClean="0"/>
           </a:p>
           <a:p>
             <a:pPr lvl="1"/>
             <a:r>
               <a:rPr lang="en-US" dirty="0" smtClean="0"/>
-              <a:t>21993 First-Links</a:t>
+              <a:t>21.993 first-links</a:t>
             </a:r>
           </a:p>
           <a:p>
@@ -4294,11 +5657,19 @@
               <a:rPr lang="en-US" dirty="0" smtClean="0"/>
               <a:t>Philosophy-Game</a:t>
             </a:r>
+            <a:endParaRPr lang="en-US" dirty="0" smtClean="0"/>
           </a:p>
           <a:p>
             <a:r>
               <a:rPr lang="en-US" dirty="0" err="1" smtClean="0"/>
               <a:t>WikiGame</a:t>
+            </a:r>
+            <a:endParaRPr lang="en-US" dirty="0" smtClean="0"/>
+          </a:p>
+          <a:p>
+            <a:r>
+              <a:rPr lang="en-US" dirty="0" smtClean="0"/>
+              <a:t>5-clicks-to-Jesus</a:t>
             </a:r>
             <a:endParaRPr lang="en-US" dirty="0" smtClean="0"/>
           </a:p>
@@ -4385,16 +5756,16 @@
         </p:nvSpPr>
         <p:spPr>
           <a:xfrm>
-            <a:off x="9134375" y="3453633"/>
-            <a:ext cx="1153426" cy="257515"/>
+            <a:off x="9017163" y="3408240"/>
+            <a:ext cx="1395640" cy="311592"/>
           </a:xfrm>
           <a:prstGeom prst="ellipse">
             <a:avLst/>
           </a:prstGeom>
           <a:noFill/>
-          <a:ln w="28575">
+          <a:ln w="57150">
             <a:solidFill>
-              <a:srgbClr val="FF0000"/>
+              <a:srgbClr val="C00000"/>
             </a:solidFill>
           </a:ln>
         </p:spPr>
@@ -4436,9 +5807,9 @@
             <a:avLst/>
           </a:prstGeom>
           <a:noFill/>
-          <a:ln w="28575">
+          <a:ln w="57150">
             <a:solidFill>
-              <a:srgbClr val="FF0000"/>
+              <a:srgbClr val="C00000"/>
             </a:solidFill>
           </a:ln>
         </p:spPr>
@@ -4485,21 +5856,24 @@
           <a:bodyPr wrap="square" rtlCol="0">
             <a:spAutoFit/>
           </a:bodyPr>
-          <a:lstStyle/>
-          <a:p>
-            <a:r>
-              <a:rPr lang="en-US" dirty="0" smtClean="0">
-                <a:solidFill>
-                  <a:srgbClr val="FF0000"/>
-                </a:solidFill>
-              </a:rPr>
+          <a:lstStyle>
+            <a:defPPr>
+              <a:defRPr lang="de-DE"/>
+            </a:defPPr>
+            <a:lvl1pPr>
+              <a:defRPr b="1">
+                <a:solidFill>
+                  <a:srgbClr val="C00000"/>
+                </a:solidFill>
+              </a:defRPr>
+            </a:lvl1pPr>
+          </a:lstStyle>
+          <a:p>
+            <a:r>
+              <a:rPr lang="en-US" dirty="0"/>
               <a:t>Links</a:t>
             </a:r>
-            <a:endParaRPr lang="de-AT" dirty="0">
-              <a:solidFill>
-                <a:srgbClr val="FF0000"/>
-              </a:solidFill>
-            </a:endParaRPr>
+            <a:endParaRPr lang="de-AT" dirty="0"/>
           </a:p>
         </p:txBody>
       </p:sp>
@@ -4514,28 +5888,28 @@
         </p:nvCxnSpPr>
         <p:spPr>
           <a:xfrm flipV="1">
-            <a:off x="9151268" y="3711148"/>
-            <a:ext cx="559820" cy="658689"/>
+            <a:off x="9151268" y="3719832"/>
+            <a:ext cx="563715" cy="650005"/>
           </a:xfrm>
           <a:prstGeom prst="straightConnector1">
             <a:avLst/>
           </a:prstGeom>
-          <a:ln>
+          <a:ln w="38100">
             <a:solidFill>
-              <a:srgbClr val="FF0000"/>
+              <a:srgbClr val="C00000"/>
             </a:solidFill>
             <a:tailEnd type="triangle"/>
           </a:ln>
         </p:spPr>
         <p:style>
           <a:lnRef idx="1">
-            <a:schemeClr val="accent2"/>
+            <a:schemeClr val="accent1"/>
           </a:lnRef>
           <a:fillRef idx="0">
-            <a:schemeClr val="accent2"/>
+            <a:schemeClr val="accent1"/>
           </a:fillRef>
           <a:effectRef idx="0">
-            <a:schemeClr val="accent2"/>
+            <a:schemeClr val="accent1"/>
           </a:effectRef>
           <a:fontRef idx="minor">
             <a:schemeClr val="tx1"/>
@@ -4559,9 +5933,9 @@
           <a:prstGeom prst="straightConnector1">
             <a:avLst/>
           </a:prstGeom>
-          <a:ln>
+          <a:ln w="38100">
             <a:solidFill>
-              <a:srgbClr val="FF0000"/>
+              <a:srgbClr val="C00000"/>
             </a:solidFill>
             <a:tailEnd type="triangle"/>
           </a:ln>
@@ -4597,9 +5971,9 @@
           <a:prstGeom prst="straightConnector1">
             <a:avLst/>
           </a:prstGeom>
-          <a:ln>
+          <a:ln w="38100">
             <a:solidFill>
-              <a:srgbClr val="FF0000"/>
+              <a:srgbClr val="C00000"/>
             </a:solidFill>
             <a:tailEnd type="triangle"/>
           </a:ln>
@@ -4670,6 +6044,127 @@
           <a:xfrm flipV="1">
             <a:off x="5664400" y="3582391"/>
             <a:ext cx="505393" cy="611996"/>
+          </a:xfrm>
+          <a:prstGeom prst="straightConnector1">
+            <a:avLst/>
+          </a:prstGeom>
+          <a:ln w="38100">
+            <a:solidFill>
+              <a:srgbClr val="C00000"/>
+            </a:solidFill>
+            <a:tailEnd type="triangle"/>
+          </a:ln>
+        </p:spPr>
+        <p:style>
+          <a:lnRef idx="1">
+            <a:schemeClr val="accent1"/>
+          </a:lnRef>
+          <a:fillRef idx="0">
+            <a:schemeClr val="accent1"/>
+          </a:fillRef>
+          <a:effectRef idx="0">
+            <a:schemeClr val="accent1"/>
+          </a:effectRef>
+          <a:fontRef idx="minor">
+            <a:schemeClr val="tx1"/>
+          </a:fontRef>
+        </p:style>
+      </p:cxnSp>
+      <p:sp>
+        <p:nvSpPr>
+          <p:cNvPr id="15" name="Oval 14"/>
+          <p:cNvSpPr/>
+          <p:nvPr/>
+        </p:nvSpPr>
+        <p:spPr>
+          <a:xfrm>
+            <a:off x="5915184" y="1547189"/>
+            <a:ext cx="3741410" cy="946239"/>
+          </a:xfrm>
+          <a:prstGeom prst="ellipse">
+            <a:avLst/>
+          </a:prstGeom>
+          <a:noFill/>
+          <a:ln w="57150">
+            <a:solidFill>
+              <a:srgbClr val="C00000"/>
+            </a:solidFill>
+          </a:ln>
+        </p:spPr>
+        <p:style>
+          <a:lnRef idx="2">
+            <a:schemeClr val="accent2"/>
+          </a:lnRef>
+          <a:fillRef idx="1">
+            <a:schemeClr val="lt1"/>
+          </a:fillRef>
+          <a:effectRef idx="0">
+            <a:schemeClr val="accent2"/>
+          </a:effectRef>
+          <a:fontRef idx="minor">
+            <a:schemeClr val="dk1"/>
+          </a:fontRef>
+        </p:style>
+        <p:txBody>
+          <a:bodyPr rtlCol="0" anchor="ctr"/>
+          <a:lstStyle/>
+          <a:p>
+            <a:pPr algn="ctr"/>
+            <a:endParaRPr lang="de-AT"/>
+          </a:p>
+        </p:txBody>
+      </p:sp>
+      <p:sp>
+        <p:nvSpPr>
+          <p:cNvPr id="17" name="TextBox 16"/>
+          <p:cNvSpPr txBox="1"/>
+          <p:nvPr/>
+        </p:nvSpPr>
+        <p:spPr>
+          <a:xfrm>
+            <a:off x="10076737" y="986402"/>
+            <a:ext cx="1277063" cy="369332"/>
+          </a:xfrm>
+          <a:prstGeom prst="rect">
+            <a:avLst/>
+          </a:prstGeom>
+          <a:noFill/>
+        </p:spPr>
+        <p:txBody>
+          <a:bodyPr wrap="square" rtlCol="0">
+            <a:spAutoFit/>
+          </a:bodyPr>
+          <a:lstStyle/>
+          <a:p>
+            <a:r>
+              <a:rPr lang="en-US" b="1" dirty="0" smtClean="0">
+                <a:solidFill>
+                  <a:srgbClr val="C00000"/>
+                </a:solidFill>
+              </a:rPr>
+              <a:t>Article</a:t>
+            </a:r>
+            <a:endParaRPr lang="de-AT" b="1" dirty="0">
+              <a:solidFill>
+                <a:srgbClr val="C00000"/>
+              </a:solidFill>
+            </a:endParaRPr>
+          </a:p>
+        </p:txBody>
+      </p:sp>
+      <p:cxnSp>
+        <p:nvCxnSpPr>
+          <p:cNvPr id="18" name="Straight Arrow Connector 17"/>
+          <p:cNvCxnSpPr>
+            <a:stCxn id="17" idx="1"/>
+            <a:endCxn id="15" idx="7"/>
+          </p:cNvCxnSpPr>
+          <p:nvPr/>
+        </p:nvCxnSpPr>
+        <p:spPr>
+          <a:xfrm flipH="1">
+            <a:off x="9108677" y="1171068"/>
+            <a:ext cx="968060" cy="514694"/>
           </a:xfrm>
           <a:prstGeom prst="straightConnector1">
             <a:avLst/>
@@ -4750,6 +6245,225 @@
           <a:p>
             <a:r>
               <a:rPr lang="en-US" dirty="0" smtClean="0"/>
+              <a:t>Graph-DB Concepts</a:t>
+            </a:r>
+            <a:endParaRPr lang="de-AT" dirty="0"/>
+          </a:p>
+        </p:txBody>
+      </p:sp>
+      <p:sp>
+        <p:nvSpPr>
+          <p:cNvPr id="3" name="Content Placeholder 2"/>
+          <p:cNvSpPr>
+            <a:spLocks noGrp="1"/>
+          </p:cNvSpPr>
+          <p:nvPr>
+            <p:ph sz="half" idx="1"/>
+          </p:nvPr>
+        </p:nvSpPr>
+        <p:spPr/>
+        <p:txBody>
+          <a:bodyPr/>
+          <a:lstStyle/>
+          <a:p>
+            <a:r>
+              <a:rPr lang="en-US" dirty="0" smtClean="0"/>
+              <a:t>Ideas</a:t>
+            </a:r>
+          </a:p>
+          <a:p>
+            <a:pPr lvl="1"/>
+            <a:r>
+              <a:rPr lang="en-US" dirty="0" smtClean="0"/>
+              <a:t>RDBMS: Slow Joins</a:t>
+            </a:r>
+          </a:p>
+          <a:p>
+            <a:pPr lvl="1"/>
+            <a:r>
+              <a:rPr lang="en-US" dirty="0" smtClean="0"/>
+              <a:t>Natural Relations</a:t>
+            </a:r>
+          </a:p>
+          <a:p>
+            <a:pPr lvl="1"/>
+            <a:r>
+              <a:rPr lang="en-US" dirty="0" smtClean="0"/>
+              <a:t>Graph Theory (math)</a:t>
+            </a:r>
+          </a:p>
+          <a:p>
+            <a:endParaRPr lang="en-US" dirty="0" smtClean="0"/>
+          </a:p>
+          <a:p>
+            <a:r>
+              <a:rPr lang="en-US" dirty="0" smtClean="0"/>
+              <a:t>Components</a:t>
+            </a:r>
+            <a:endParaRPr lang="en-US" dirty="0"/>
+          </a:p>
+          <a:p>
+            <a:pPr lvl="1"/>
+            <a:r>
+              <a:rPr lang="en-US" dirty="0" smtClean="0"/>
+              <a:t>Nodes (Entities)</a:t>
+            </a:r>
+          </a:p>
+          <a:p>
+            <a:pPr lvl="1"/>
+            <a:r>
+              <a:rPr lang="en-US" dirty="0" smtClean="0"/>
+              <a:t>Edges (Relationships)</a:t>
+            </a:r>
+          </a:p>
+          <a:p>
+            <a:pPr lvl="1"/>
+            <a:r>
+              <a:rPr lang="en-US" dirty="0" smtClean="0"/>
+              <a:t>Properties (Data)</a:t>
+            </a:r>
+          </a:p>
+          <a:p>
+            <a:endParaRPr lang="de-AT" dirty="0"/>
+          </a:p>
+        </p:txBody>
+      </p:sp>
+      <p:pic>
+        <p:nvPicPr>
+          <p:cNvPr id="2050" name="Picture 2" descr="from relational model"/>
+          <p:cNvPicPr>
+            <a:picLocks noChangeAspect="1" noChangeArrowheads="1"/>
+          </p:cNvPicPr>
+          <p:nvPr/>
+        </p:nvPicPr>
+        <p:blipFill>
+          <a:blip r:embed="rId2" cstate="print">
+            <a:extLst>
+              <a:ext uri="{28A0092B-C50C-407E-A947-70E740481C1C}">
+                <a14:useLocalDpi xmlns:a14="http://schemas.microsoft.com/office/drawing/2010/main" val="0"/>
+              </a:ext>
+            </a:extLst>
+          </a:blip>
+          <a:srcRect/>
+          <a:stretch>
+            <a:fillRect/>
+          </a:stretch>
+        </p:blipFill>
+        <p:spPr bwMode="auto">
+          <a:xfrm>
+            <a:off x="7624284" y="574991"/>
+            <a:ext cx="3809198" cy="2019642"/>
+          </a:xfrm>
+          <a:prstGeom prst="rect">
+            <a:avLst/>
+          </a:prstGeom>
+          <a:noFill/>
+          <a:extLst>
+            <a:ext uri="{909E8E84-426E-40DD-AFC4-6F175D3DCCD1}">
+              <a14:hiddenFill xmlns:a14="http://schemas.microsoft.com/office/drawing/2010/main">
+                <a:solidFill>
+                  <a:srgbClr val="FFFFFF"/>
+                </a:solidFill>
+              </a14:hiddenFill>
+            </a:ext>
+          </a:extLst>
+        </p:spPr>
+      </p:pic>
+      <p:pic>
+        <p:nvPicPr>
+          <p:cNvPr id="2052" name="Picture 4" descr="to graph model"/>
+          <p:cNvPicPr>
+            <a:picLocks noChangeAspect="1" noChangeArrowheads="1"/>
+          </p:cNvPicPr>
+          <p:nvPr/>
+        </p:nvPicPr>
+        <p:blipFill>
+          <a:blip r:embed="rId3">
+            <a:extLst>
+              <a:ext uri="{28A0092B-C50C-407E-A947-70E740481C1C}">
+                <a14:useLocalDpi xmlns:a14="http://schemas.microsoft.com/office/drawing/2010/main" val="0"/>
+              </a:ext>
+            </a:extLst>
+          </a:blip>
+          <a:srcRect/>
+          <a:stretch>
+            <a:fillRect/>
+          </a:stretch>
+        </p:blipFill>
+        <p:spPr bwMode="auto">
+          <a:xfrm>
+            <a:off x="5880756" y="2461335"/>
+            <a:ext cx="5552726" cy="3850565"/>
+          </a:xfrm>
+          <a:prstGeom prst="rect">
+            <a:avLst/>
+          </a:prstGeom>
+          <a:noFill/>
+          <a:extLst>
+            <a:ext uri="{909E8E84-426E-40DD-AFC4-6F175D3DCCD1}">
+              <a14:hiddenFill xmlns:a14="http://schemas.microsoft.com/office/drawing/2010/main">
+                <a:solidFill>
+                  <a:srgbClr val="FFFFFF"/>
+                </a:solidFill>
+              </a14:hiddenFill>
+            </a:ext>
+          </a:extLst>
+        </p:spPr>
+      </p:pic>
+    </p:spTree>
+    <p:extLst>
+      <p:ext uri="{BB962C8B-B14F-4D97-AF65-F5344CB8AC3E}">
+        <p14:creationId xmlns:p14="http://schemas.microsoft.com/office/powerpoint/2010/main" val="3490408120"/>
+      </p:ext>
+    </p:extLst>
+  </p:cSld>
+  <p:clrMapOvr>
+    <a:masterClrMapping/>
+  </p:clrMapOvr>
+  <p:timing>
+    <p:tnLst>
+      <p:par>
+        <p:cTn id="1" dur="indefinite" restart="never" nodeType="tmRoot"/>
+      </p:par>
+    </p:tnLst>
+  </p:timing>
+</p:sld>
+</file>
+
+<file path=ppt/slides/slide7.xml><?xml version="1.0" encoding="utf-8"?>
+<p:sld xmlns:a="http://schemas.openxmlformats.org/drawingml/2006/main" xmlns:r="http://schemas.openxmlformats.org/officeDocument/2006/relationships" xmlns:p="http://schemas.openxmlformats.org/presentationml/2006/main">
+  <p:cSld>
+    <p:spTree>
+      <p:nvGrpSpPr>
+        <p:cNvPr id="1" name=""/>
+        <p:cNvGrpSpPr/>
+        <p:nvPr/>
+      </p:nvGrpSpPr>
+      <p:grpSpPr>
+        <a:xfrm>
+          <a:off x="0" y="0"/>
+          <a:ext cx="0" cy="0"/>
+          <a:chOff x="0" y="0"/>
+          <a:chExt cx="0" cy="0"/>
+        </a:xfrm>
+      </p:grpSpPr>
+      <p:sp>
+        <p:nvSpPr>
+          <p:cNvPr id="2" name="Title 1"/>
+          <p:cNvSpPr>
+            <a:spLocks noGrp="1"/>
+          </p:cNvSpPr>
+          <p:nvPr>
+            <p:ph type="title"/>
+          </p:nvPr>
+        </p:nvSpPr>
+        <p:spPr/>
+        <p:txBody>
+          <a:bodyPr/>
+          <a:lstStyle/>
+          <a:p>
+            <a:r>
+              <a:rPr lang="en-US" dirty="0" smtClean="0"/>
               <a:t>Neo4j vs SQL (Basics)</a:t>
             </a:r>
             <a:endParaRPr lang="de-AT" dirty="0"/>
@@ -7202,7 +8916,7 @@
 </p:sld>
 </file>
 
-<file path=ppt/slides/slide7.xml><?xml version="1.0" encoding="utf-8"?>
+<file path=ppt/slides/slide8.xml><?xml version="1.0" encoding="utf-8"?>
 <p:sld xmlns:a="http://schemas.openxmlformats.org/drawingml/2006/main" xmlns:r="http://schemas.openxmlformats.org/officeDocument/2006/relationships" xmlns:p="http://schemas.openxmlformats.org/presentationml/2006/main">
   <p:cSld>
     <p:spTree>

</xml_diff>

<commit_message>
Added conclusion in presentation. Updated benchmarks in presentation.
</commit_message>
<xml_diff>
--- a/doc/presentation/Presentation.pptx
+++ b/doc/presentation/Presentation.pptx
@@ -5,7 +5,7 @@
     <p:sldMasterId id="2147483648" r:id="rId1"/>
   </p:sldMasterIdLst>
   <p:notesMasterIdLst>
-    <p:notesMasterId r:id="rId11"/>
+    <p:notesMasterId r:id="rId13"/>
   </p:notesMasterIdLst>
   <p:sldIdLst>
     <p:sldId id="256" r:id="rId2"/>
@@ -17,6 +17,8 @@
     <p:sldId id="261" r:id="rId8"/>
     <p:sldId id="263" r:id="rId9"/>
     <p:sldId id="266" r:id="rId10"/>
+    <p:sldId id="271" r:id="rId11"/>
+    <p:sldId id="272" r:id="rId12"/>
   </p:sldIdLst>
   <p:sldSz cx="12192000" cy="6858000"/>
   <p:notesSz cx="6858000" cy="9144000"/>
@@ -205,7 +207,7 @@
           <a:p>
             <a:fld id="{3F01BFE0-0997-4107-ACA7-B4A8D910E1CD}" type="datetimeFigureOut">
               <a:rPr lang="de-AT" smtClean="0"/>
-              <a:t>28.01.2015</a:t>
+              <a:t>29.01.2015</a:t>
             </a:fld>
             <a:endParaRPr lang="de-AT"/>
           </a:p>
@@ -1133,52 +1135,6 @@
           <a:bodyPr/>
           <a:lstStyle/>
           <a:p>
-            <a:r>
-              <a:rPr lang="en-US" dirty="0" smtClean="0"/>
-              <a:t>Insert</a:t>
-            </a:r>
-          </a:p>
-          <a:p>
-            <a:pPr lvl="1"/>
-            <a:r>
-              <a:rPr lang="en-US" dirty="0" smtClean="0"/>
-              <a:t>Pages</a:t>
-            </a:r>
-          </a:p>
-          <a:p>
-            <a:pPr lvl="1"/>
-            <a:r>
-              <a:rPr lang="en-US" dirty="0" smtClean="0"/>
-              <a:t>Links</a:t>
-            </a:r>
-          </a:p>
-          <a:p>
-            <a:r>
-              <a:rPr lang="en-US" dirty="0" smtClean="0"/>
-              <a:t>Delete?</a:t>
-            </a:r>
-          </a:p>
-          <a:p>
-            <a:r>
-              <a:rPr lang="en-US" dirty="0" smtClean="0"/>
-              <a:t>Find 1 Page by Title</a:t>
-            </a:r>
-          </a:p>
-          <a:p>
-            <a:r>
-              <a:rPr lang="en-US" dirty="0" smtClean="0"/>
-              <a:t>Find Sources of Philosophy</a:t>
-            </a:r>
-          </a:p>
-          <a:p>
-            <a:pPr lvl="1"/>
-            <a:r>
-              <a:rPr lang="en-US" dirty="0" smtClean="0"/>
-              <a:t>1-4 Hops</a:t>
-            </a:r>
-            <a:endParaRPr lang="de-AT" dirty="0" smtClean="0"/>
-          </a:p>
-          <a:p>
             <a:endParaRPr lang="de-AT" dirty="0"/>
           </a:p>
         </p:txBody>
@@ -1350,7 +1306,7 @@
           <a:p>
             <a:fld id="{A3B8F320-EA2B-40CC-8263-8EA8D2114AB4}" type="datetimeFigureOut">
               <a:rPr lang="de-AT" smtClean="0"/>
-              <a:t>28.01.2015</a:t>
+              <a:t>29.01.2015</a:t>
             </a:fld>
             <a:endParaRPr lang="de-AT"/>
           </a:p>
@@ -1520,7 +1476,7 @@
           <a:p>
             <a:fld id="{A3B8F320-EA2B-40CC-8263-8EA8D2114AB4}" type="datetimeFigureOut">
               <a:rPr lang="de-AT" smtClean="0"/>
-              <a:t>28.01.2015</a:t>
+              <a:t>29.01.2015</a:t>
             </a:fld>
             <a:endParaRPr lang="de-AT"/>
           </a:p>
@@ -1700,7 +1656,7 @@
           <a:p>
             <a:fld id="{A3B8F320-EA2B-40CC-8263-8EA8D2114AB4}" type="datetimeFigureOut">
               <a:rPr lang="de-AT" smtClean="0"/>
-              <a:t>28.01.2015</a:t>
+              <a:t>29.01.2015</a:t>
             </a:fld>
             <a:endParaRPr lang="de-AT"/>
           </a:p>
@@ -1870,7 +1826,7 @@
           <a:p>
             <a:fld id="{A3B8F320-EA2B-40CC-8263-8EA8D2114AB4}" type="datetimeFigureOut">
               <a:rPr lang="de-AT" smtClean="0"/>
-              <a:t>28.01.2015</a:t>
+              <a:t>29.01.2015</a:t>
             </a:fld>
             <a:endParaRPr lang="de-AT"/>
           </a:p>
@@ -2116,7 +2072,7 @@
           <a:p>
             <a:fld id="{A3B8F320-EA2B-40CC-8263-8EA8D2114AB4}" type="datetimeFigureOut">
               <a:rPr lang="de-AT" smtClean="0"/>
-              <a:t>28.01.2015</a:t>
+              <a:t>29.01.2015</a:t>
             </a:fld>
             <a:endParaRPr lang="de-AT"/>
           </a:p>
@@ -2348,7 +2304,7 @@
           <a:p>
             <a:fld id="{A3B8F320-EA2B-40CC-8263-8EA8D2114AB4}" type="datetimeFigureOut">
               <a:rPr lang="de-AT" smtClean="0"/>
-              <a:t>28.01.2015</a:t>
+              <a:t>29.01.2015</a:t>
             </a:fld>
             <a:endParaRPr lang="de-AT"/>
           </a:p>
@@ -2715,7 +2671,7 @@
           <a:p>
             <a:fld id="{A3B8F320-EA2B-40CC-8263-8EA8D2114AB4}" type="datetimeFigureOut">
               <a:rPr lang="de-AT" smtClean="0"/>
-              <a:t>28.01.2015</a:t>
+              <a:t>29.01.2015</a:t>
             </a:fld>
             <a:endParaRPr lang="de-AT"/>
           </a:p>
@@ -2833,7 +2789,7 @@
           <a:p>
             <a:fld id="{A3B8F320-EA2B-40CC-8263-8EA8D2114AB4}" type="datetimeFigureOut">
               <a:rPr lang="de-AT" smtClean="0"/>
-              <a:t>28.01.2015</a:t>
+              <a:t>29.01.2015</a:t>
             </a:fld>
             <a:endParaRPr lang="de-AT"/>
           </a:p>
@@ -2928,7 +2884,7 @@
           <a:p>
             <a:fld id="{A3B8F320-EA2B-40CC-8263-8EA8D2114AB4}" type="datetimeFigureOut">
               <a:rPr lang="de-AT" smtClean="0"/>
-              <a:t>28.01.2015</a:t>
+              <a:t>29.01.2015</a:t>
             </a:fld>
             <a:endParaRPr lang="de-AT"/>
           </a:p>
@@ -3205,7 +3161,7 @@
           <a:p>
             <a:fld id="{A3B8F320-EA2B-40CC-8263-8EA8D2114AB4}" type="datetimeFigureOut">
               <a:rPr lang="de-AT" smtClean="0"/>
-              <a:t>28.01.2015</a:t>
+              <a:t>29.01.2015</a:t>
             </a:fld>
             <a:endParaRPr lang="de-AT"/>
           </a:p>
@@ -3458,7 +3414,7 @@
           <a:p>
             <a:fld id="{A3B8F320-EA2B-40CC-8263-8EA8D2114AB4}" type="datetimeFigureOut">
               <a:rPr lang="de-AT" smtClean="0"/>
-              <a:t>28.01.2015</a:t>
+              <a:t>29.01.2015</a:t>
             </a:fld>
             <a:endParaRPr lang="de-AT"/>
           </a:p>
@@ -3671,7 +3627,7 @@
           <a:p>
             <a:fld id="{A3B8F320-EA2B-40CC-8263-8EA8D2114AB4}" type="datetimeFigureOut">
               <a:rPr lang="de-AT" smtClean="0"/>
-              <a:t>28.01.2015</a:t>
+              <a:t>29.01.2015</a:t>
             </a:fld>
             <a:endParaRPr lang="de-AT"/>
           </a:p>
@@ -4126,6 +4082,260 @@
     <p:extLst>
       <p:ext uri="{BB962C8B-B14F-4D97-AF65-F5344CB8AC3E}">
         <p14:creationId xmlns:p14="http://schemas.microsoft.com/office/powerpoint/2010/main" val="192787014"/>
+      </p:ext>
+    </p:extLst>
+  </p:cSld>
+  <p:clrMapOvr>
+    <a:masterClrMapping/>
+  </p:clrMapOvr>
+  <p:timing>
+    <p:tnLst>
+      <p:par>
+        <p:cTn id="1" dur="indefinite" restart="never" nodeType="tmRoot"/>
+      </p:par>
+    </p:tnLst>
+  </p:timing>
+</p:sld>
+</file>
+
+<file path=ppt/slides/slide10.xml><?xml version="1.0" encoding="utf-8"?>
+<p:sld xmlns:a="http://schemas.openxmlformats.org/drawingml/2006/main" xmlns:r="http://schemas.openxmlformats.org/officeDocument/2006/relationships" xmlns:p="http://schemas.openxmlformats.org/presentationml/2006/main">
+  <p:cSld>
+    <p:spTree>
+      <p:nvGrpSpPr>
+        <p:cNvPr id="1" name=""/>
+        <p:cNvGrpSpPr/>
+        <p:nvPr/>
+      </p:nvGrpSpPr>
+      <p:grpSpPr>
+        <a:xfrm>
+          <a:off x="0" y="0"/>
+          <a:ext cx="0" cy="0"/>
+          <a:chOff x="0" y="0"/>
+          <a:chExt cx="0" cy="0"/>
+        </a:xfrm>
+      </p:grpSpPr>
+      <p:sp>
+        <p:nvSpPr>
+          <p:cNvPr id="2" name="Title 1"/>
+          <p:cNvSpPr>
+            <a:spLocks noGrp="1"/>
+          </p:cNvSpPr>
+          <p:nvPr>
+            <p:ph type="title"/>
+          </p:nvPr>
+        </p:nvSpPr>
+        <p:spPr/>
+        <p:txBody>
+          <a:bodyPr/>
+          <a:lstStyle/>
+          <a:p>
+            <a:r>
+              <a:rPr lang="en-US" dirty="0" smtClean="0"/>
+              <a:t>Conclusion</a:t>
+            </a:r>
+            <a:endParaRPr lang="de-AT" dirty="0"/>
+          </a:p>
+        </p:txBody>
+      </p:sp>
+      <p:sp>
+        <p:nvSpPr>
+          <p:cNvPr id="5" name="Content Placeholder 4"/>
+          <p:cNvSpPr>
+            <a:spLocks noGrp="1"/>
+          </p:cNvSpPr>
+          <p:nvPr>
+            <p:ph sz="half" idx="1"/>
+          </p:nvPr>
+        </p:nvSpPr>
+        <p:spPr/>
+        <p:txBody>
+          <a:bodyPr/>
+          <a:lstStyle/>
+          <a:p>
+            <a:pPr marL="0" indent="0">
+              <a:buNone/>
+            </a:pPr>
+            <a:r>
+              <a:rPr lang="en-US" b="1" dirty="0" smtClean="0"/>
+              <a:t>Pro</a:t>
+            </a:r>
+          </a:p>
+          <a:p>
+            <a:r>
+              <a:rPr lang="en-US" dirty="0" smtClean="0"/>
+              <a:t>Fast Insert</a:t>
+            </a:r>
+          </a:p>
+          <a:p>
+            <a:r>
+              <a:rPr lang="en-US" dirty="0" smtClean="0"/>
+              <a:t>Easy Queries</a:t>
+            </a:r>
+          </a:p>
+          <a:p>
+            <a:endParaRPr lang="en-US" dirty="0"/>
+          </a:p>
+          <a:p>
+            <a:pPr marL="0" indent="0">
+              <a:buNone/>
+            </a:pPr>
+            <a:r>
+              <a:rPr lang="en-US" b="1" dirty="0" smtClean="0"/>
+              <a:t>Contra</a:t>
+            </a:r>
+          </a:p>
+          <a:p>
+            <a:r>
+              <a:rPr lang="en-US" dirty="0" smtClean="0"/>
+              <a:t>Slow</a:t>
+            </a:r>
+          </a:p>
+          <a:p>
+            <a:r>
+              <a:rPr lang="en-US" dirty="0" smtClean="0"/>
+              <a:t>Not mature</a:t>
+            </a:r>
+          </a:p>
+        </p:txBody>
+      </p:sp>
+      <p:sp>
+        <p:nvSpPr>
+          <p:cNvPr id="7" name="Content Placeholder 6"/>
+          <p:cNvSpPr>
+            <a:spLocks noGrp="1"/>
+          </p:cNvSpPr>
+          <p:nvPr>
+            <p:ph sz="half" idx="2"/>
+          </p:nvPr>
+        </p:nvSpPr>
+        <p:spPr/>
+        <p:txBody>
+          <a:bodyPr/>
+          <a:lstStyle/>
+          <a:p>
+            <a:pPr marL="0" indent="0">
+              <a:buNone/>
+            </a:pPr>
+            <a:r>
+              <a:rPr lang="en-US" b="1" dirty="0" smtClean="0"/>
+              <a:t>Maybe Pro (didn’t looked into it)</a:t>
+            </a:r>
+          </a:p>
+          <a:p>
+            <a:r>
+              <a:rPr lang="en-US" dirty="0" smtClean="0"/>
+              <a:t>Scalability</a:t>
+            </a:r>
+          </a:p>
+          <a:p>
+            <a:r>
+              <a:rPr lang="en-US" dirty="0" smtClean="0"/>
+              <a:t>Other DBs than Neo4j</a:t>
+            </a:r>
+          </a:p>
+          <a:p>
+            <a:endParaRPr lang="en-US" dirty="0" smtClean="0"/>
+          </a:p>
+          <a:p>
+            <a:pPr marL="0" indent="0">
+              <a:buNone/>
+            </a:pPr>
+            <a:r>
+              <a:rPr lang="en-US" b="1" dirty="0" smtClean="0"/>
+              <a:t>Our Recommendation</a:t>
+            </a:r>
+          </a:p>
+          <a:p>
+            <a:r>
+              <a:rPr lang="en-US" dirty="0" smtClean="0"/>
+              <a:t>Use Cypher as Query Language and convert it to SQL</a:t>
+            </a:r>
+          </a:p>
+          <a:p>
+            <a:pPr marL="0" indent="0">
+              <a:buNone/>
+            </a:pPr>
+            <a:endParaRPr lang="de-AT" dirty="0"/>
+          </a:p>
+        </p:txBody>
+      </p:sp>
+    </p:spTree>
+    <p:extLst>
+      <p:ext uri="{BB962C8B-B14F-4D97-AF65-F5344CB8AC3E}">
+        <p14:creationId xmlns:p14="http://schemas.microsoft.com/office/powerpoint/2010/main" val="1452473823"/>
+      </p:ext>
+    </p:extLst>
+  </p:cSld>
+  <p:clrMapOvr>
+    <a:masterClrMapping/>
+  </p:clrMapOvr>
+</p:sld>
+</file>
+
+<file path=ppt/slides/slide11.xml><?xml version="1.0" encoding="utf-8"?>
+<p:sld xmlns:a="http://schemas.openxmlformats.org/drawingml/2006/main" xmlns:r="http://schemas.openxmlformats.org/officeDocument/2006/relationships" xmlns:p="http://schemas.openxmlformats.org/presentationml/2006/main">
+  <p:cSld>
+    <p:spTree>
+      <p:nvGrpSpPr>
+        <p:cNvPr id="1" name=""/>
+        <p:cNvGrpSpPr/>
+        <p:nvPr/>
+      </p:nvGrpSpPr>
+      <p:grpSpPr>
+        <a:xfrm>
+          <a:off x="0" y="0"/>
+          <a:ext cx="0" cy="0"/>
+          <a:chOff x="0" y="0"/>
+          <a:chExt cx="0" cy="0"/>
+        </a:xfrm>
+      </p:grpSpPr>
+      <p:sp>
+        <p:nvSpPr>
+          <p:cNvPr id="5" name="Title 4"/>
+          <p:cNvSpPr>
+            <a:spLocks noGrp="1"/>
+          </p:cNvSpPr>
+          <p:nvPr>
+            <p:ph type="title"/>
+          </p:nvPr>
+        </p:nvSpPr>
+        <p:spPr/>
+        <p:txBody>
+          <a:bodyPr/>
+          <a:lstStyle/>
+          <a:p>
+            <a:r>
+              <a:rPr lang="en-US" dirty="0" smtClean="0"/>
+              <a:t>Thanks</a:t>
+            </a:r>
+            <a:endParaRPr lang="de-AT" dirty="0"/>
+          </a:p>
+        </p:txBody>
+      </p:sp>
+      <p:sp>
+        <p:nvSpPr>
+          <p:cNvPr id="6" name="Text Placeholder 5"/>
+          <p:cNvSpPr>
+            <a:spLocks noGrp="1"/>
+          </p:cNvSpPr>
+          <p:nvPr>
+            <p:ph type="body" idx="1"/>
+          </p:nvPr>
+        </p:nvSpPr>
+        <p:spPr/>
+        <p:txBody>
+          <a:bodyPr/>
+          <a:lstStyle/>
+          <a:p>
+            <a:endParaRPr lang="de-AT"/>
+          </a:p>
+        </p:txBody>
+      </p:sp>
+    </p:spTree>
+    <p:extLst>
+      <p:ext uri="{BB962C8B-B14F-4D97-AF65-F5344CB8AC3E}">
+        <p14:creationId xmlns:p14="http://schemas.microsoft.com/office/powerpoint/2010/main" val="3235135433"/>
       </p:ext>
     </p:extLst>
   </p:cSld>
@@ -5856,16 +6066,10 @@
           </a:p>
           <a:p>
             <a:r>
-              <a:rPr lang="en-US" dirty="0" err="1" smtClean="0"/>
-              <a:t>WikiGame</a:t>
-            </a:r>
-            <a:endParaRPr lang="en-US" dirty="0" smtClean="0"/>
-          </a:p>
-          <a:p>
-            <a:r>
               <a:rPr lang="en-US" dirty="0" smtClean="0"/>
               <a:t>5-clicks-to-Jesus</a:t>
             </a:r>
+            <a:endParaRPr lang="en-US" dirty="0" smtClean="0"/>
           </a:p>
           <a:p>
             <a:endParaRPr lang="de-AT" dirty="0"/>
@@ -11539,6 +11743,11 @@
           </p:cNvGraphicFramePr>
           <p:nvPr>
             <p:ph idx="1"/>
+            <p:extLst>
+              <p:ext uri="{D42A27DB-BD31-4B8C-83A1-F6EECF244321}">
+                <p14:modId xmlns:p14="http://schemas.microsoft.com/office/powerpoint/2010/main" val="2514918344"/>
+              </p:ext>
+            </p:extLst>
           </p:nvPr>
         </p:nvGraphicFramePr>
         <p:xfrm>
@@ -11867,7 +12076,7 @@
                     <a:p>
                       <a:r>
                         <a:rPr lang="en-US" dirty="0" smtClean="0"/>
-                        <a:t>53ms</a:t>
+                        <a:t>50ms</a:t>
                       </a:r>
                       <a:endParaRPr lang="de-AT" dirty="0"/>
                     </a:p>
@@ -11881,7 +12090,7 @@
                     <a:p>
                       <a:r>
                         <a:rPr lang="en-US" dirty="0" smtClean="0"/>
-                        <a:t>&lt;0s</a:t>
+                        <a:t>30ms</a:t>
                       </a:r>
                       <a:endParaRPr lang="de-AT" dirty="0"/>
                     </a:p>
@@ -12005,7 +12214,7 @@
                     <a:p>
                       <a:r>
                         <a:rPr lang="en-US" dirty="0" smtClean="0"/>
-                        <a:t>&lt;0s</a:t>
+                        <a:t>30-35ms</a:t>
                       </a:r>
                       <a:endParaRPr lang="de-AT" dirty="0"/>
                     </a:p>
@@ -12071,7 +12280,7 @@
                     <a:p>
                       <a:r>
                         <a:rPr lang="en-US" dirty="0" smtClean="0"/>
-                        <a:t>&lt;0s</a:t>
+                        <a:t>110-120ms</a:t>
                       </a:r>
                       <a:endParaRPr lang="de-AT" dirty="0"/>
                     </a:p>
@@ -12154,7 +12363,7 @@
                     <a:p>
                       <a:r>
                         <a:rPr lang="en-US" dirty="0" smtClean="0"/>
-                        <a:t>&lt;0s</a:t>
+                        <a:t>480-500ms</a:t>
                       </a:r>
                       <a:endParaRPr lang="de-AT" dirty="0"/>
                     </a:p>
@@ -12224,7 +12433,7 @@
                     <a:p>
                       <a:r>
                         <a:rPr lang="en-US" dirty="0" smtClean="0"/>
-                        <a:t>8s</a:t>
+                        <a:t>7,3s</a:t>
                       </a:r>
                       <a:endParaRPr lang="de-AT" dirty="0"/>
                     </a:p>
@@ -12246,6 +12455,13 @@
   <p:clrMapOvr>
     <a:masterClrMapping/>
   </p:clrMapOvr>
+  <p:timing>
+    <p:tnLst>
+      <p:par>
+        <p:cTn id="1" dur="indefinite" restart="never" nodeType="tmRoot"/>
+      </p:par>
+    </p:tnLst>
+  </p:timing>
 </p:sld>
 </file>
 

</xml_diff>

<commit_message>
replaced . by , as decimal separator
</commit_message>
<xml_diff>
--- a/doc/presentation/Presentation.pptx
+++ b/doc/presentation/Presentation.pptx
@@ -4570,7 +4570,11 @@
             </a:r>
             <a:r>
               <a:rPr lang="de-AT" dirty="0" smtClean="0"/>
-              <a:t>164.379.808 lines?</a:t>
+              <a:t>164,379,808 </a:t>
+            </a:r>
+            <a:r>
+              <a:rPr lang="de-AT" dirty="0" smtClean="0"/>
+              <a:t>lines?</a:t>
             </a:r>
           </a:p>
           <a:p>
@@ -6016,14 +6020,22 @@
             <a:pPr lvl="1"/>
             <a:r>
               <a:rPr lang="en-US" dirty="0" smtClean="0"/>
-              <a:t>15.113.788 articles</a:t>
+              <a:t>15,113,788 </a:t>
+            </a:r>
+            <a:r>
+              <a:rPr lang="en-US" dirty="0" smtClean="0"/>
+              <a:t>articles</a:t>
             </a:r>
           </a:p>
           <a:p>
             <a:pPr lvl="1"/>
             <a:r>
               <a:rPr lang="en-US" dirty="0" smtClean="0"/>
-              <a:t>164.379.808 links</a:t>
+              <a:t>164,379,808 </a:t>
+            </a:r>
+            <a:r>
+              <a:rPr lang="en-US" dirty="0" smtClean="0"/>
+              <a:t>links</a:t>
             </a:r>
           </a:p>
           <a:p>
@@ -6041,21 +6053,33 @@
             <a:pPr lvl="1"/>
             <a:r>
               <a:rPr lang="en-US" dirty="0" smtClean="0"/>
-              <a:t>31.814 articles</a:t>
+              <a:t>31,814 </a:t>
+            </a:r>
+            <a:r>
+              <a:rPr lang="en-US" dirty="0" smtClean="0"/>
+              <a:t>articles</a:t>
             </a:r>
           </a:p>
           <a:p>
             <a:pPr lvl="1"/>
             <a:r>
               <a:rPr lang="en-US" dirty="0" smtClean="0"/>
-              <a:t>299.032 links</a:t>
+              <a:t>299,032 </a:t>
+            </a:r>
+            <a:r>
+              <a:rPr lang="en-US" dirty="0" smtClean="0"/>
+              <a:t>links</a:t>
             </a:r>
           </a:p>
           <a:p>
             <a:pPr lvl="1"/>
             <a:r>
               <a:rPr lang="en-US" dirty="0" smtClean="0"/>
-              <a:t>21.993 first-links</a:t>
+              <a:t>21,993 </a:t>
+            </a:r>
+            <a:r>
+              <a:rPr lang="en-US" dirty="0" smtClean="0"/>
+              <a:t>first-links</a:t>
             </a:r>
           </a:p>
           <a:p>
@@ -11744,7 +11768,7 @@
             <p:ph idx="1"/>
             <p:extLst>
               <p:ext uri="{D42A27DB-BD31-4B8C-83A1-F6EECF244321}">
-                <p14:modId xmlns:p14="http://schemas.microsoft.com/office/powerpoint/2010/main" val="2305682164"/>
+                <p14:modId xmlns:p14="http://schemas.microsoft.com/office/powerpoint/2010/main" val="3922314383"/>
               </p:ext>
             </p:extLst>
           </p:nvPr>
@@ -11916,7 +11940,15 @@
                     <a:p>
                       <a:r>
                         <a:rPr lang="en-US" dirty="0" smtClean="0"/>
-                        <a:t>Pages (31.841)</a:t>
+                        <a:t>Pages (</a:t>
+                      </a:r>
+                      <a:r>
+                        <a:rPr lang="en-US" dirty="0" smtClean="0"/>
+                        <a:t>31,841</a:t>
+                      </a:r>
+                      <a:r>
+                        <a:rPr lang="en-US" dirty="0" smtClean="0"/>
+                        <a:t>)</a:t>
                       </a:r>
                       <a:endParaRPr lang="de-AT" dirty="0"/>
                     </a:p>
@@ -11980,7 +12012,15 @@
                     <a:p>
                       <a:r>
                         <a:rPr lang="en-US" dirty="0" smtClean="0"/>
-                        <a:t>Links (299.032)</a:t>
+                        <a:t>Links (</a:t>
+                      </a:r>
+                      <a:r>
+                        <a:rPr lang="en-US" dirty="0" smtClean="0"/>
+                        <a:t>299,032</a:t>
+                      </a:r>
+                      <a:r>
+                        <a:rPr lang="en-US" dirty="0" smtClean="0"/>
+                        <a:t>)</a:t>
                       </a:r>
                       <a:endParaRPr lang="de-AT" dirty="0"/>
                     </a:p>
@@ -12044,7 +12084,15 @@
                     <a:p>
                       <a:r>
                         <a:rPr lang="en-US" dirty="0" smtClean="0"/>
-                        <a:t>First Links (21.993)</a:t>
+                        <a:t>First Links (</a:t>
+                      </a:r>
+                      <a:r>
+                        <a:rPr lang="en-US" dirty="0" smtClean="0"/>
+                        <a:t>21,993</a:t>
+                      </a:r>
+                      <a:r>
+                        <a:rPr lang="en-US" dirty="0" smtClean="0"/>
+                        <a:t>)</a:t>
                       </a:r>
                       <a:endParaRPr lang="de-AT" dirty="0"/>
                     </a:p>
@@ -12353,7 +12401,15 @@
                       </a:r>
                       <a:r>
                         <a:rPr lang="en-US" baseline="0" dirty="0" smtClean="0"/>
-                        <a:t> (2.057)</a:t>
+                        <a:t> (</a:t>
+                      </a:r>
+                      <a:r>
+                        <a:rPr lang="en-US" baseline="0" dirty="0" smtClean="0"/>
+                        <a:t>2,057</a:t>
+                      </a:r>
+                      <a:r>
+                        <a:rPr lang="en-US" baseline="0" dirty="0" smtClean="0"/>
+                        <a:t>)</a:t>
                       </a:r>
                       <a:endParaRPr lang="de-AT" dirty="0"/>
                     </a:p>
@@ -12429,7 +12485,15 @@
                       </a:r>
                       <a:r>
                         <a:rPr lang="en-US" dirty="0" smtClean="0"/>
-                        <a:t> (14.240)</a:t>
+                        <a:t> (</a:t>
+                      </a:r>
+                      <a:r>
+                        <a:rPr lang="en-US" dirty="0" smtClean="0"/>
+                        <a:t>14,240</a:t>
+                      </a:r>
+                      <a:r>
+                        <a:rPr lang="en-US" dirty="0" smtClean="0"/>
+                        <a:t>)</a:t>
                       </a:r>
                       <a:endParaRPr lang="de-AT" dirty="0"/>
                     </a:p>
@@ -12526,7 +12590,15 @@
                       </a:r>
                       <a:r>
                         <a:rPr lang="en-US" dirty="0" smtClean="0"/>
-                        <a:t> (25.558)</a:t>
+                        <a:t> (</a:t>
+                      </a:r>
+                      <a:r>
+                        <a:rPr lang="en-US" dirty="0" smtClean="0"/>
+                        <a:t>25,558</a:t>
+                      </a:r>
+                      <a:r>
+                        <a:rPr lang="en-US" dirty="0" smtClean="0"/>
+                        <a:t>)</a:t>
                       </a:r>
                       <a:endParaRPr lang="de-AT" dirty="0"/>
                     </a:p>

</xml_diff>

<commit_message>
worked on doc an presentation.
</commit_message>
<xml_diff>
--- a/doc/presentation/Presentation.pptx
+++ b/doc/presentation/Presentation.pptx
@@ -6116,9 +6116,9 @@
             <a:avLst/>
           </a:prstGeom>
           <a:noFill/>
-          <a:ln w="57150">
+          <a:ln w="28575">
             <a:solidFill>
-              <a:srgbClr val="C00000"/>
+              <a:srgbClr val="FF0000"/>
             </a:solidFill>
           </a:ln>
         </p:spPr>
@@ -6160,9 +6160,9 @@
             <a:avLst/>
           </a:prstGeom>
           <a:noFill/>
-          <a:ln w="57150">
+          <a:ln w="28575">
             <a:solidFill>
-              <a:srgbClr val="C00000"/>
+              <a:srgbClr val="FFC000"/>
             </a:solidFill>
           </a:ln>
         </p:spPr>
@@ -6204,9 +6204,9 @@
             <a:avLst/>
           </a:prstGeom>
           <a:noFill/>
-          <a:ln w="57150">
+          <a:ln w="28575">
             <a:solidFill>
-              <a:srgbClr val="C00000"/>
+              <a:srgbClr val="FFC000"/>
             </a:solidFill>
           </a:ln>
         </p:spPr>
@@ -6248,6 +6248,9 @@
             <a:avLst/>
           </a:prstGeom>
           <a:noFill/>
+          <a:ln>
+            <a:noFill/>
+          </a:ln>
         </p:spPr>
         <p:txBody>
           <a:bodyPr wrap="square" rtlCol="0">
@@ -6267,10 +6270,18 @@
           </a:lstStyle>
           <a:p>
             <a:r>
-              <a:rPr lang="en-US" dirty="0"/>
+              <a:rPr lang="en-US" dirty="0">
+                <a:solidFill>
+                  <a:srgbClr val="FFC000"/>
+                </a:solidFill>
+              </a:rPr>
               <a:t>Links</a:t>
             </a:r>
-            <a:endParaRPr lang="de-AT" dirty="0"/>
+            <a:endParaRPr lang="de-AT" dirty="0">
+              <a:solidFill>
+                <a:srgbClr val="FFC000"/>
+              </a:solidFill>
+            </a:endParaRPr>
           </a:p>
         </p:txBody>
       </p:sp>
@@ -6291,9 +6302,9 @@
           <a:prstGeom prst="straightConnector1">
             <a:avLst/>
           </a:prstGeom>
-          <a:ln w="38100">
+          <a:ln w="19050">
             <a:solidFill>
-              <a:srgbClr val="C00000"/>
+              <a:srgbClr val="FFC000"/>
             </a:solidFill>
             <a:tailEnd type="triangle"/>
           </a:ln>
@@ -6330,9 +6341,9 @@
           <a:prstGeom prst="straightConnector1">
             <a:avLst/>
           </a:prstGeom>
-          <a:ln w="38100">
+          <a:ln w="19050">
             <a:solidFill>
-              <a:srgbClr val="C00000"/>
+              <a:srgbClr val="FFC000"/>
             </a:solidFill>
             <a:tailEnd type="triangle"/>
           </a:ln>
@@ -6368,9 +6379,9 @@
           <a:prstGeom prst="straightConnector1">
             <a:avLst/>
           </a:prstGeom>
-          <a:ln w="38100">
+          <a:ln w="19050">
             <a:solidFill>
-              <a:srgbClr val="C00000"/>
+              <a:srgbClr val="FFC000"/>
             </a:solidFill>
             <a:tailEnd type="triangle"/>
           </a:ln>
@@ -6445,7 +6456,7 @@
           <a:prstGeom prst="straightConnector1">
             <a:avLst/>
           </a:prstGeom>
-          <a:ln w="38100">
+          <a:ln w="19050">
             <a:solidFill>
               <a:srgbClr val="C00000"/>
             </a:solidFill>
@@ -6484,7 +6495,7 @@
           <a:noFill/>
           <a:ln w="57150">
             <a:solidFill>
-              <a:srgbClr val="C00000"/>
+              <a:schemeClr val="accent1"/>
             </a:solidFill>
           </a:ln>
         </p:spPr>
@@ -6536,14 +6547,14 @@
             <a:r>
               <a:rPr lang="en-US" b="1" dirty="0" smtClean="0">
                 <a:solidFill>
-                  <a:srgbClr val="C00000"/>
+                  <a:schemeClr val="accent1"/>
                 </a:solidFill>
               </a:rPr>
               <a:t>Article</a:t>
             </a:r>
             <a:endParaRPr lang="de-AT" b="1" dirty="0">
               <a:solidFill>
-                <a:srgbClr val="C00000"/>
+                <a:schemeClr val="accent1"/>
               </a:solidFill>
             </a:endParaRPr>
           </a:p>
@@ -6568,7 +6579,7 @@
           </a:prstGeom>
           <a:ln w="38100">
             <a:solidFill>
-              <a:srgbClr val="C00000"/>
+              <a:schemeClr val="accent1"/>
             </a:solidFill>
             <a:tailEnd type="triangle"/>
           </a:ln>

</xml_diff>

<commit_message>
final touches to presentation exported doc and presentation
</commit_message>
<xml_diff>
--- a/doc/presentation/Presentation.pptx
+++ b/doc/presentation/Presentation.pptx
@@ -1,6 +1,6 @@
 
 <file path=ppt/presentation.xml><?xml version="1.0" encoding="utf-8"?>
-<p:presentation xmlns:a="http://schemas.openxmlformats.org/drawingml/2006/main" xmlns:r="http://schemas.openxmlformats.org/officeDocument/2006/relationships" xmlns:p="http://schemas.openxmlformats.org/presentationml/2006/main" saveSubsetFonts="1">
+<p:presentation xmlns:a="http://schemas.openxmlformats.org/drawingml/2006/main" xmlns:r="http://schemas.openxmlformats.org/officeDocument/2006/relationships" xmlns:p="http://schemas.openxmlformats.org/presentationml/2006/main" showSpecialPlsOnTitleSld="0" saveSubsetFonts="1">
   <p:sldMasterIdLst>
     <p:sldMasterId id="2147483648" r:id="rId1"/>
   </p:sldMasterIdLst>
@@ -1304,7 +1304,7 @@
           <a:bodyPr/>
           <a:lstStyle/>
           <a:p>
-            <a:fld id="{A3B8F320-EA2B-40CC-8263-8EA8D2114AB4}" type="datetimeFigureOut">
+            <a:fld id="{E71A7928-01A6-4BF9-8CF1-9E1808927F6E}" type="datetime1">
               <a:rPr lang="de-AT" smtClean="0"/>
               <a:t>29.01.2015</a:t>
             </a:fld>
@@ -1327,7 +1327,7 @@
           <a:bodyPr/>
           <a:lstStyle/>
           <a:p>
-            <a:endParaRPr lang="de-AT"/>
+            <a:endParaRPr lang="de-AT" dirty="0"/>
           </a:p>
         </p:txBody>
       </p:sp>
@@ -1474,7 +1474,7 @@
           <a:bodyPr/>
           <a:lstStyle/>
           <a:p>
-            <a:fld id="{A3B8F320-EA2B-40CC-8263-8EA8D2114AB4}" type="datetimeFigureOut">
+            <a:fld id="{9D5D97B7-4BBA-4BA7-9AAC-77BD0814F0F4}" type="datetime1">
               <a:rPr lang="de-AT" smtClean="0"/>
               <a:t>29.01.2015</a:t>
             </a:fld>
@@ -1654,7 +1654,7 @@
           <a:bodyPr/>
           <a:lstStyle/>
           <a:p>
-            <a:fld id="{A3B8F320-EA2B-40CC-8263-8EA8D2114AB4}" type="datetimeFigureOut">
+            <a:fld id="{B46D1944-6001-4B31-B8D2-C338B59898B2}" type="datetime1">
               <a:rPr lang="de-AT" smtClean="0"/>
               <a:t>29.01.2015</a:t>
             </a:fld>
@@ -1824,7 +1824,7 @@
           <a:bodyPr/>
           <a:lstStyle/>
           <a:p>
-            <a:fld id="{A3B8F320-EA2B-40CC-8263-8EA8D2114AB4}" type="datetimeFigureOut">
+            <a:fld id="{E0AF36A5-076E-4827-98D2-551528576B57}" type="datetime1">
               <a:rPr lang="de-AT" smtClean="0"/>
               <a:t>29.01.2015</a:t>
             </a:fld>
@@ -2070,7 +2070,7 @@
           <a:bodyPr/>
           <a:lstStyle/>
           <a:p>
-            <a:fld id="{A3B8F320-EA2B-40CC-8263-8EA8D2114AB4}" type="datetimeFigureOut">
+            <a:fld id="{16A02ACE-A08D-4367-85F8-D56A46B0483D}" type="datetime1">
               <a:rPr lang="de-AT" smtClean="0"/>
               <a:t>29.01.2015</a:t>
             </a:fld>
@@ -2302,7 +2302,7 @@
           <a:bodyPr/>
           <a:lstStyle/>
           <a:p>
-            <a:fld id="{A3B8F320-EA2B-40CC-8263-8EA8D2114AB4}" type="datetimeFigureOut">
+            <a:fld id="{6E2443C7-1EBE-444D-A456-FCC247818E2B}" type="datetime1">
               <a:rPr lang="de-AT" smtClean="0"/>
               <a:t>29.01.2015</a:t>
             </a:fld>
@@ -2669,7 +2669,7 @@
           <a:bodyPr/>
           <a:lstStyle/>
           <a:p>
-            <a:fld id="{A3B8F320-EA2B-40CC-8263-8EA8D2114AB4}" type="datetimeFigureOut">
+            <a:fld id="{82D169D4-E7CF-45D9-B8EA-D0B40CCAD8AF}" type="datetime1">
               <a:rPr lang="de-AT" smtClean="0"/>
               <a:t>29.01.2015</a:t>
             </a:fld>
@@ -2787,7 +2787,7 @@
           <a:bodyPr/>
           <a:lstStyle/>
           <a:p>
-            <a:fld id="{A3B8F320-EA2B-40CC-8263-8EA8D2114AB4}" type="datetimeFigureOut">
+            <a:fld id="{E8F6FDA2-8F72-4DC1-BB0A-623628346F69}" type="datetime1">
               <a:rPr lang="de-AT" smtClean="0"/>
               <a:t>29.01.2015</a:t>
             </a:fld>
@@ -2882,7 +2882,7 @@
           <a:bodyPr/>
           <a:lstStyle/>
           <a:p>
-            <a:fld id="{A3B8F320-EA2B-40CC-8263-8EA8D2114AB4}" type="datetimeFigureOut">
+            <a:fld id="{20E3ABB5-5738-45CD-9672-9BDDBCD5FE7B}" type="datetime1">
               <a:rPr lang="de-AT" smtClean="0"/>
               <a:t>29.01.2015</a:t>
             </a:fld>
@@ -3159,7 +3159,7 @@
           <a:bodyPr/>
           <a:lstStyle/>
           <a:p>
-            <a:fld id="{A3B8F320-EA2B-40CC-8263-8EA8D2114AB4}" type="datetimeFigureOut">
+            <a:fld id="{6F1569A3-3340-484A-8072-A56F774ABD2C}" type="datetime1">
               <a:rPr lang="de-AT" smtClean="0"/>
               <a:t>29.01.2015</a:t>
             </a:fld>
@@ -3412,7 +3412,7 @@
           <a:bodyPr/>
           <a:lstStyle/>
           <a:p>
-            <a:fld id="{A3B8F320-EA2B-40CC-8263-8EA8D2114AB4}" type="datetimeFigureOut">
+            <a:fld id="{6146E563-1D0C-46F4-AA01-FDDB5FE53727}" type="datetime1">
               <a:rPr lang="de-AT" smtClean="0"/>
               <a:t>29.01.2015</a:t>
             </a:fld>
@@ -3625,7 +3625,7 @@
             </a:lvl1pPr>
           </a:lstStyle>
           <a:p>
-            <a:fld id="{A3B8F320-EA2B-40CC-8263-8EA8D2114AB4}" type="datetimeFigureOut">
+            <a:fld id="{B1C2D92A-5287-46FE-84EE-05229CBF3127}" type="datetime1">
               <a:rPr lang="de-AT" smtClean="0"/>
               <a:t>29.01.2015</a:t>
             </a:fld>
@@ -3732,6 +3732,7 @@
     <p:sldLayoutId id="2147483658" r:id="rId10"/>
     <p:sldLayoutId id="2147483659" r:id="rId11"/>
   </p:sldLayoutIdLst>
+  <p:hf hdr="0" ftr="0"/>
   <p:txStyles>
     <p:titleStyle>
       <a:lvl1pPr algn="l" defTabSz="914400" rtl="0" eaLnBrk="1" latinLnBrk="0" hangingPunct="1">
@@ -4194,8 +4195,19 @@
           <a:p>
             <a:r>
               <a:rPr lang="en-US" dirty="0" smtClean="0"/>
-              <a:t>Not mature</a:t>
-            </a:r>
+              <a:t>Not </a:t>
+            </a:r>
+            <a:r>
+              <a:rPr lang="en-US" dirty="0" smtClean="0"/>
+              <a:t>mature</a:t>
+            </a:r>
+          </a:p>
+          <a:p>
+            <a:r>
+              <a:rPr lang="en-US" dirty="0" smtClean="0"/>
+              <a:t>Memory consumption</a:t>
+            </a:r>
+            <a:endParaRPr lang="en-US" dirty="0" smtClean="0"/>
           </a:p>
         </p:txBody>
       </p:sp>
@@ -4249,13 +4261,74 @@
           <a:p>
             <a:r>
               <a:rPr lang="en-US" dirty="0" smtClean="0"/>
-              <a:t>Use Cypher as Query Language and convert it to SQL</a:t>
-            </a:r>
+              <a:t>Use Cypher where time is not important</a:t>
+            </a:r>
+          </a:p>
+          <a:p>
+            <a:r>
+              <a:rPr lang="en-US" dirty="0" smtClean="0"/>
+              <a:t>Cypher to SQL </a:t>
+            </a:r>
+            <a:r>
+              <a:rPr lang="en-US" dirty="0" err="1" smtClean="0"/>
+              <a:t>transpiler</a:t>
+            </a:r>
+            <a:r>
+              <a:rPr lang="en-US" dirty="0" smtClean="0"/>
+              <a:t> would be awesome</a:t>
+            </a:r>
+            <a:endParaRPr lang="en-US" dirty="0" smtClean="0"/>
           </a:p>
           <a:p>
             <a:pPr marL="0" indent="0">
               <a:buNone/>
             </a:pPr>
+            <a:endParaRPr lang="de-AT" dirty="0"/>
+          </a:p>
+        </p:txBody>
+      </p:sp>
+      <p:sp>
+        <p:nvSpPr>
+          <p:cNvPr id="3" name="Date Placeholder 2"/>
+          <p:cNvSpPr>
+            <a:spLocks noGrp="1"/>
+          </p:cNvSpPr>
+          <p:nvPr>
+            <p:ph type="dt" sz="half" idx="10"/>
+          </p:nvPr>
+        </p:nvSpPr>
+        <p:spPr/>
+        <p:txBody>
+          <a:bodyPr/>
+          <a:lstStyle/>
+          <a:p>
+            <a:fld id="{D592F601-1832-42C6-98D1-0352EB4D54B6}" type="datetime1">
+              <a:rPr lang="de-AT" smtClean="0"/>
+              <a:t>29.01.2015</a:t>
+            </a:fld>
+            <a:endParaRPr lang="de-AT"/>
+          </a:p>
+        </p:txBody>
+      </p:sp>
+      <p:sp>
+        <p:nvSpPr>
+          <p:cNvPr id="4" name="Slide Number Placeholder 3"/>
+          <p:cNvSpPr>
+            <a:spLocks noGrp="1"/>
+          </p:cNvSpPr>
+          <p:nvPr>
+            <p:ph type="sldNum" sz="quarter" idx="12"/>
+          </p:nvPr>
+        </p:nvSpPr>
+        <p:spPr/>
+        <p:txBody>
+          <a:bodyPr/>
+          <a:lstStyle/>
+          <a:p>
+            <a:fld id="{4637FC0D-AE17-4C51-98EC-5EFAFF6C163A}" type="slidenum">
+              <a:rPr lang="de-AT" smtClean="0"/>
+              <a:t>10</a:t>
+            </a:fld>
             <a:endParaRPr lang="de-AT" dirty="0"/>
           </a:p>
         </p:txBody>
@@ -4270,6 +4343,16 @@
   <p:clrMapOvr>
     <a:masterClrMapping/>
   </p:clrMapOvr>
+  <p:transition spd="slow">
+    <p:push/>
+  </p:transition>
+  <p:timing>
+    <p:tnLst>
+      <p:par>
+        <p:cTn id="1" dur="indefinite" restart="never" nodeType="tmRoot"/>
+      </p:par>
+    </p:tnLst>
+  </p:timing>
 </p:sld>
 </file>
 
@@ -4328,6 +4411,56 @@
           <a:bodyPr/>
           <a:lstStyle/>
           <a:p>
+            <a:r>
+              <a:rPr lang="de-AT" dirty="0" smtClean="0"/>
+              <a:t>Questions?</a:t>
+            </a:r>
+            <a:endParaRPr lang="de-AT" dirty="0"/>
+          </a:p>
+        </p:txBody>
+      </p:sp>
+      <p:sp>
+        <p:nvSpPr>
+          <p:cNvPr id="2" name="Date Placeholder 1"/>
+          <p:cNvSpPr>
+            <a:spLocks noGrp="1"/>
+          </p:cNvSpPr>
+          <p:nvPr>
+            <p:ph type="dt" sz="half" idx="10"/>
+          </p:nvPr>
+        </p:nvSpPr>
+        <p:spPr/>
+        <p:txBody>
+          <a:bodyPr/>
+          <a:lstStyle/>
+          <a:p>
+            <a:fld id="{C04817CE-3F51-4A14-89BD-A722886A92CB}" type="datetime1">
+              <a:rPr lang="de-AT" smtClean="0"/>
+              <a:t>29.01.2015</a:t>
+            </a:fld>
+            <a:endParaRPr lang="de-AT"/>
+          </a:p>
+        </p:txBody>
+      </p:sp>
+      <p:sp>
+        <p:nvSpPr>
+          <p:cNvPr id="3" name="Slide Number Placeholder 2"/>
+          <p:cNvSpPr>
+            <a:spLocks noGrp="1"/>
+          </p:cNvSpPr>
+          <p:nvPr>
+            <p:ph type="sldNum" sz="quarter" idx="12"/>
+          </p:nvPr>
+        </p:nvSpPr>
+        <p:spPr/>
+        <p:txBody>
+          <a:bodyPr/>
+          <a:lstStyle/>
+          <a:p>
+            <a:fld id="{4637FC0D-AE17-4C51-98EC-5EFAFF6C163A}" type="slidenum">
+              <a:rPr lang="de-AT" smtClean="0"/>
+              <a:t>11</a:t>
+            </a:fld>
             <a:endParaRPr lang="de-AT"/>
           </a:p>
         </p:txBody>
@@ -4342,6 +4475,9 @@
   <p:clrMapOvr>
     <a:masterClrMapping/>
   </p:clrMapOvr>
+  <p:transition spd="slow">
+    <p:push/>
+  </p:transition>
   <p:timing>
     <p:tnLst>
       <p:par>
@@ -4457,6 +4593,76 @@
           </a:p>
         </p:txBody>
       </p:sp>
+      <p:sp>
+        <p:nvSpPr>
+          <p:cNvPr id="4" name="Date Placeholder 3"/>
+          <p:cNvSpPr>
+            <a:spLocks noGrp="1"/>
+          </p:cNvSpPr>
+          <p:nvPr>
+            <p:ph type="dt" sz="half" idx="10"/>
+          </p:nvPr>
+        </p:nvSpPr>
+        <p:spPr/>
+        <p:txBody>
+          <a:bodyPr/>
+          <a:lstStyle/>
+          <a:p>
+            <a:fld id="{23970CD1-031C-4C0E-B722-BEB61EC7C4EF}" type="datetime1">
+              <a:rPr lang="de-AT" smtClean="0"/>
+              <a:t>29.01.2015</a:t>
+            </a:fld>
+            <a:endParaRPr lang="de-AT"/>
+          </a:p>
+        </p:txBody>
+      </p:sp>
+      <p:sp>
+        <p:nvSpPr>
+          <p:cNvPr id="5" name="Slide Number Placeholder 4"/>
+          <p:cNvSpPr>
+            <a:spLocks noGrp="1"/>
+          </p:cNvSpPr>
+          <p:nvPr>
+            <p:ph type="sldNum" sz="quarter" idx="12"/>
+          </p:nvPr>
+        </p:nvSpPr>
+        <p:spPr/>
+        <p:txBody>
+          <a:bodyPr/>
+          <a:lstStyle/>
+          <a:p>
+            <a:fld id="{4637FC0D-AE17-4C51-98EC-5EFAFF6C163A}" type="slidenum">
+              <a:rPr lang="de-AT" smtClean="0"/>
+              <a:t>2</a:t>
+            </a:fld>
+            <a:endParaRPr lang="de-AT"/>
+          </a:p>
+        </p:txBody>
+      </p:sp>
+      <p:pic>
+        <p:nvPicPr>
+          <p:cNvPr id="6" name="Picture 5"/>
+          <p:cNvPicPr>
+            <a:picLocks noChangeAspect="1"/>
+          </p:cNvPicPr>
+          <p:nvPr/>
+        </p:nvPicPr>
+        <p:blipFill>
+          <a:blip r:embed="rId3"/>
+          <a:stretch>
+            <a:fillRect/>
+          </a:stretch>
+        </p:blipFill>
+        <p:spPr>
+          <a:xfrm>
+            <a:off x="5050962" y="1954711"/>
+            <a:ext cx="6022194" cy="3619250"/>
+          </a:xfrm>
+          <a:prstGeom prst="rect">
+            <a:avLst/>
+          </a:prstGeom>
+        </p:spPr>
+      </p:pic>
     </p:spTree>
     <p:extLst>
       <p:ext uri="{BB962C8B-B14F-4D97-AF65-F5344CB8AC3E}">
@@ -4467,6 +4673,9 @@
   <p:clrMapOvr>
     <a:masterClrMapping/>
   </p:clrMapOvr>
+  <p:transition spd="slow">
+    <p:push/>
+  </p:transition>
   <p:timing>
     <p:tnLst>
       <p:par>
@@ -4715,6 +4924,52 @@
           </a:p>
         </p:txBody>
       </p:sp>
+      <p:sp>
+        <p:nvSpPr>
+          <p:cNvPr id="3" name="Date Placeholder 2"/>
+          <p:cNvSpPr>
+            <a:spLocks noGrp="1"/>
+          </p:cNvSpPr>
+          <p:nvPr>
+            <p:ph type="dt" sz="half" idx="10"/>
+          </p:nvPr>
+        </p:nvSpPr>
+        <p:spPr/>
+        <p:txBody>
+          <a:bodyPr/>
+          <a:lstStyle/>
+          <a:p>
+            <a:fld id="{8DF86E5E-C1E1-4F00-97A8-B51FF26FB137}" type="datetime1">
+              <a:rPr lang="de-AT" smtClean="0"/>
+              <a:t>29.01.2015</a:t>
+            </a:fld>
+            <a:endParaRPr lang="de-AT"/>
+          </a:p>
+        </p:txBody>
+      </p:sp>
+      <p:sp>
+        <p:nvSpPr>
+          <p:cNvPr id="4" name="Slide Number Placeholder 3"/>
+          <p:cNvSpPr>
+            <a:spLocks noGrp="1"/>
+          </p:cNvSpPr>
+          <p:nvPr>
+            <p:ph type="sldNum" sz="quarter" idx="12"/>
+          </p:nvPr>
+        </p:nvSpPr>
+        <p:spPr/>
+        <p:txBody>
+          <a:bodyPr/>
+          <a:lstStyle/>
+          <a:p>
+            <a:fld id="{4637FC0D-AE17-4C51-98EC-5EFAFF6C163A}" type="slidenum">
+              <a:rPr lang="de-AT" smtClean="0"/>
+              <a:t>3</a:t>
+            </a:fld>
+            <a:endParaRPr lang="de-AT"/>
+          </a:p>
+        </p:txBody>
+      </p:sp>
     </p:spTree>
     <p:extLst>
       <p:ext uri="{BB962C8B-B14F-4D97-AF65-F5344CB8AC3E}">
@@ -4725,6 +4980,9 @@
   <p:clrMapOvr>
     <a:masterClrMapping/>
   </p:clrMapOvr>
+  <p:transition spd="slow">
+    <p:push/>
+  </p:transition>
   <p:timing>
     <p:tnLst>
       <p:par>
@@ -4737,9 +4995,6 @@
                     <p:cTn id="3" fill="hold">
                       <p:stCondLst>
                         <p:cond delay="indefinite"/>
-                        <p:cond evt="onBegin" delay="0">
-                          <p:tn val="2"/>
-                        </p:cond>
                       </p:stCondLst>
                       <p:childTnLst>
                         <p:par>
@@ -4749,7 +5004,7 @@
                             </p:stCondLst>
                             <p:childTnLst>
                               <p:par>
-                                <p:cTn id="5" presetID="1" presetClass="entr" presetSubtype="0" fill="hold" grpId="0" nodeType="withEffect">
+                                <p:cTn id="5" presetID="1" presetClass="entr" presetSubtype="0" fill="hold" grpId="0" nodeType="clickEffect">
                                   <p:stCondLst>
                                     <p:cond delay="0"/>
                                   </p:stCondLst>
@@ -4764,7 +5019,7 @@
                                         <p:tgtEl>
                                           <p:spTgt spid="5">
                                             <p:txEl>
-                                              <p:pRg st="0" end="0"/>
+                                              <p:pRg st="1" end="1"/>
                                             </p:txEl>
                                           </p:spTgt>
                                         </p:tgtEl>
@@ -4813,7 +5068,7 @@
                                         <p:tgtEl>
                                           <p:spTgt spid="5">
                                             <p:txEl>
-                                              <p:pRg st="1" end="1"/>
+                                              <p:pRg st="2" end="2"/>
                                             </p:txEl>
                                           </p:spTgt>
                                         </p:tgtEl>
@@ -4862,7 +5117,7 @@
                                         <p:tgtEl>
                                           <p:spTgt spid="5">
                                             <p:txEl>
-                                              <p:pRg st="2" end="2"/>
+                                              <p:pRg st="3" end="3"/>
                                             </p:txEl>
                                           </p:spTgt>
                                         </p:tgtEl>
@@ -4911,7 +5166,7 @@
                                         <p:tgtEl>
                                           <p:spTgt spid="5">
                                             <p:txEl>
-                                              <p:pRg st="3" end="3"/>
+                                              <p:pRg st="4" end="4"/>
                                             </p:txEl>
                                           </p:spTgt>
                                         </p:tgtEl>
@@ -4960,7 +5215,7 @@
                                         <p:tgtEl>
                                           <p:spTgt spid="5">
                                             <p:txEl>
-                                              <p:pRg st="4" end="4"/>
+                                              <p:pRg st="5" end="5"/>
                                             </p:txEl>
                                           </p:spTgt>
                                         </p:tgtEl>
@@ -5009,7 +5264,7 @@
                                         <p:tgtEl>
                                           <p:spTgt spid="5">
                                             <p:txEl>
-                                              <p:pRg st="5" end="5"/>
+                                              <p:pRg st="6" end="6"/>
                                             </p:txEl>
                                           </p:spTgt>
                                         </p:tgtEl>
@@ -5043,7 +5298,7 @@
                             </p:stCondLst>
                             <p:childTnLst>
                               <p:par>
-                                <p:cTn id="29" presetID="1" presetClass="entr" presetSubtype="0" fill="hold" grpId="0" nodeType="clickEffect">
+                                <p:cTn id="29" presetID="1" presetClass="exit" presetSubtype="0" fill="hold" grpId="0" nodeType="clickEffect">
                                   <p:stCondLst>
                                     <p:cond delay="0"/>
                                   </p:stCondLst>
@@ -5056,18 +5311,14 @@
                                           </p:stCondLst>
                                         </p:cTn>
                                         <p:tgtEl>
-                                          <p:spTgt spid="5">
-                                            <p:txEl>
-                                              <p:pRg st="6" end="6"/>
-                                            </p:txEl>
-                                          </p:spTgt>
+                                          <p:spTgt spid="7"/>
                                         </p:tgtEl>
                                         <p:attrNameLst>
                                           <p:attrName>style.visibility</p:attrName>
                                         </p:attrNameLst>
                                       </p:cBhvr>
                                       <p:to>
-                                        <p:strVal val="visible"/>
+                                        <p:strVal val="hidden"/>
                                       </p:to>
                                     </p:set>
                                   </p:childTnLst>
@@ -5092,7 +5343,7 @@
                             </p:stCondLst>
                             <p:childTnLst>
                               <p:par>
-                                <p:cTn id="33" presetID="1" presetClass="exit" presetSubtype="0" fill="hold" grpId="0" nodeType="clickEffect">
+                                <p:cTn id="33" presetID="1" presetClass="entr" presetSubtype="0" fill="hold" grpId="0" nodeType="clickEffect">
                                   <p:stCondLst>
                                     <p:cond delay="0"/>
                                   </p:stCondLst>
@@ -5105,14 +5356,18 @@
                                           </p:stCondLst>
                                         </p:cTn>
                                         <p:tgtEl>
-                                          <p:spTgt spid="7"/>
+                                          <p:spTgt spid="5">
+                                            <p:txEl>
+                                              <p:pRg st="7" end="7"/>
+                                            </p:txEl>
+                                          </p:spTgt>
                                         </p:tgtEl>
                                         <p:attrNameLst>
                                           <p:attrName>style.visibility</p:attrName>
                                         </p:attrNameLst>
                                       </p:cBhvr>
                                       <p:to>
-                                        <p:strVal val="hidden"/>
+                                        <p:strVal val="visible"/>
                                       </p:to>
                                     </p:set>
                                   </p:childTnLst>
@@ -5152,7 +5407,7 @@
                                         <p:tgtEl>
                                           <p:spTgt spid="5">
                                             <p:txEl>
-                                              <p:pRg st="7" end="7"/>
+                                              <p:pRg st="8" end="8"/>
                                             </p:txEl>
                                           </p:spTgt>
                                         </p:tgtEl>
@@ -5201,7 +5456,7 @@
                                         <p:tgtEl>
                                           <p:spTgt spid="5">
                                             <p:txEl>
-                                              <p:pRg st="8" end="8"/>
+                                              <p:pRg st="9" end="9"/>
                                             </p:txEl>
                                           </p:spTgt>
                                         </p:tgtEl>
@@ -5243,55 +5498,6 @@
                                     <p:set>
                                       <p:cBhvr>
                                         <p:cTn id="46" dur="1" fill="hold">
-                                          <p:stCondLst>
-                                            <p:cond delay="0"/>
-                                          </p:stCondLst>
-                                        </p:cTn>
-                                        <p:tgtEl>
-                                          <p:spTgt spid="5">
-                                            <p:txEl>
-                                              <p:pRg st="9" end="9"/>
-                                            </p:txEl>
-                                          </p:spTgt>
-                                        </p:tgtEl>
-                                        <p:attrNameLst>
-                                          <p:attrName>style.visibility</p:attrName>
-                                        </p:attrNameLst>
-                                      </p:cBhvr>
-                                      <p:to>
-                                        <p:strVal val="visible"/>
-                                      </p:to>
-                                    </p:set>
-                                  </p:childTnLst>
-                                </p:cTn>
-                              </p:par>
-                            </p:childTnLst>
-                          </p:cTn>
-                        </p:par>
-                      </p:childTnLst>
-                    </p:cTn>
-                  </p:par>
-                  <p:par>
-                    <p:cTn id="47" fill="hold">
-                      <p:stCondLst>
-                        <p:cond delay="indefinite"/>
-                      </p:stCondLst>
-                      <p:childTnLst>
-                        <p:par>
-                          <p:cTn id="48" fill="hold">
-                            <p:stCondLst>
-                              <p:cond delay="0"/>
-                            </p:stCondLst>
-                            <p:childTnLst>
-                              <p:par>
-                                <p:cTn id="49" presetID="1" presetClass="entr" presetSubtype="0" fill="hold" grpId="0" nodeType="clickEffect">
-                                  <p:stCondLst>
-                                    <p:cond delay="0"/>
-                                  </p:stCondLst>
-                                  <p:childTnLst>
-                                    <p:set>
-                                      <p:cBhvr>
-                                        <p:cTn id="50" dur="1" fill="hold">
                                           <p:stCondLst>
                                             <p:cond delay="0"/>
                                           </p:stCondLst>
@@ -5342,7 +5548,7 @@
       </p:par>
     </p:tnLst>
     <p:bldLst>
-      <p:bldP spid="5" grpId="0" build="p"/>
+      <p:bldP spid="5" grpId="0" uiExpand="1" build="p"/>
       <p:bldP spid="7" grpId="0" animBg="1"/>
     </p:bldLst>
   </p:timing>
@@ -5653,6 +5859,52 @@
           </a:sp3d>
         </p:spPr>
       </p:pic>
+      <p:sp>
+        <p:nvSpPr>
+          <p:cNvPr id="5" name="Date Placeholder 4"/>
+          <p:cNvSpPr>
+            <a:spLocks noGrp="1"/>
+          </p:cNvSpPr>
+          <p:nvPr>
+            <p:ph type="dt" sz="half" idx="10"/>
+          </p:nvPr>
+        </p:nvSpPr>
+        <p:spPr/>
+        <p:txBody>
+          <a:bodyPr/>
+          <a:lstStyle/>
+          <a:p>
+            <a:fld id="{071194A8-8F36-4127-9943-70EABD469973}" type="datetime1">
+              <a:rPr lang="de-AT" smtClean="0"/>
+              <a:t>29.01.2015</a:t>
+            </a:fld>
+            <a:endParaRPr lang="de-AT"/>
+          </a:p>
+        </p:txBody>
+      </p:sp>
+      <p:sp>
+        <p:nvSpPr>
+          <p:cNvPr id="6" name="Slide Number Placeholder 5"/>
+          <p:cNvSpPr>
+            <a:spLocks noGrp="1"/>
+          </p:cNvSpPr>
+          <p:nvPr>
+            <p:ph type="sldNum" sz="quarter" idx="12"/>
+          </p:nvPr>
+        </p:nvSpPr>
+        <p:spPr/>
+        <p:txBody>
+          <a:bodyPr/>
+          <a:lstStyle/>
+          <a:p>
+            <a:fld id="{4637FC0D-AE17-4C51-98EC-5EFAFF6C163A}" type="slidenum">
+              <a:rPr lang="de-AT" smtClean="0"/>
+              <a:t>4</a:t>
+            </a:fld>
+            <a:endParaRPr lang="de-AT"/>
+          </a:p>
+        </p:txBody>
+      </p:sp>
     </p:spTree>
     <p:extLst>
       <p:ext uri="{BB962C8B-B14F-4D97-AF65-F5344CB8AC3E}">
@@ -5663,6 +5915,9 @@
   <p:clrMapOvr>
     <a:masterClrMapping/>
   </p:clrMapOvr>
+  <p:transition spd="slow">
+    <p:push/>
+  </p:transition>
   <p:timing>
     <p:tnLst>
       <p:par>
@@ -6599,6 +6854,52 @@
           </a:fontRef>
         </p:style>
       </p:cxnSp>
+      <p:sp>
+        <p:nvSpPr>
+          <p:cNvPr id="4" name="Date Placeholder 3"/>
+          <p:cNvSpPr>
+            <a:spLocks noGrp="1"/>
+          </p:cNvSpPr>
+          <p:nvPr>
+            <p:ph type="dt" sz="half" idx="10"/>
+          </p:nvPr>
+        </p:nvSpPr>
+        <p:spPr/>
+        <p:txBody>
+          <a:bodyPr/>
+          <a:lstStyle/>
+          <a:p>
+            <a:fld id="{DC383798-2C70-4AE2-97C3-934F8D3843E1}" type="datetime1">
+              <a:rPr lang="de-AT" smtClean="0"/>
+              <a:t>29.01.2015</a:t>
+            </a:fld>
+            <a:endParaRPr lang="de-AT"/>
+          </a:p>
+        </p:txBody>
+      </p:sp>
+      <p:sp>
+        <p:nvSpPr>
+          <p:cNvPr id="5" name="Slide Number Placeholder 4"/>
+          <p:cNvSpPr>
+            <a:spLocks noGrp="1"/>
+          </p:cNvSpPr>
+          <p:nvPr>
+            <p:ph type="sldNum" sz="quarter" idx="12"/>
+          </p:nvPr>
+        </p:nvSpPr>
+        <p:spPr/>
+        <p:txBody>
+          <a:bodyPr/>
+          <a:lstStyle/>
+          <a:p>
+            <a:fld id="{4637FC0D-AE17-4C51-98EC-5EFAFF6C163A}" type="slidenum">
+              <a:rPr lang="de-AT" smtClean="0"/>
+              <a:t>5</a:t>
+            </a:fld>
+            <a:endParaRPr lang="de-AT"/>
+          </a:p>
+        </p:txBody>
+      </p:sp>
     </p:spTree>
     <p:extLst>
       <p:ext uri="{BB962C8B-B14F-4D97-AF65-F5344CB8AC3E}">
@@ -6609,6 +6910,9 @@
   <p:clrMapOvr>
     <a:masterClrMapping/>
   </p:clrMapOvr>
+  <p:transition spd="slow">
+    <p:push/>
+  </p:transition>
   <p:timing>
     <p:tnLst>
       <p:par>
@@ -6818,6 +7122,52 @@
           </a:extLst>
         </p:spPr>
       </p:pic>
+      <p:sp>
+        <p:nvSpPr>
+          <p:cNvPr id="4" name="Date Placeholder 3"/>
+          <p:cNvSpPr>
+            <a:spLocks noGrp="1"/>
+          </p:cNvSpPr>
+          <p:nvPr>
+            <p:ph type="dt" sz="half" idx="10"/>
+          </p:nvPr>
+        </p:nvSpPr>
+        <p:spPr/>
+        <p:txBody>
+          <a:bodyPr/>
+          <a:lstStyle/>
+          <a:p>
+            <a:fld id="{A23DCA2F-B217-4793-B443-56D04D597B15}" type="datetime1">
+              <a:rPr lang="de-AT" smtClean="0"/>
+              <a:t>29.01.2015</a:t>
+            </a:fld>
+            <a:endParaRPr lang="de-AT"/>
+          </a:p>
+        </p:txBody>
+      </p:sp>
+      <p:sp>
+        <p:nvSpPr>
+          <p:cNvPr id="5" name="Slide Number Placeholder 4"/>
+          <p:cNvSpPr>
+            <a:spLocks noGrp="1"/>
+          </p:cNvSpPr>
+          <p:nvPr>
+            <p:ph type="sldNum" sz="quarter" idx="12"/>
+          </p:nvPr>
+        </p:nvSpPr>
+        <p:spPr/>
+        <p:txBody>
+          <a:bodyPr/>
+          <a:lstStyle/>
+          <a:p>
+            <a:fld id="{4637FC0D-AE17-4C51-98EC-5EFAFF6C163A}" type="slidenum">
+              <a:rPr lang="de-AT" smtClean="0"/>
+              <a:t>6</a:t>
+            </a:fld>
+            <a:endParaRPr lang="de-AT"/>
+          </a:p>
+        </p:txBody>
+      </p:sp>
     </p:spTree>
     <p:extLst>
       <p:ext uri="{BB962C8B-B14F-4D97-AF65-F5344CB8AC3E}">
@@ -6828,6 +7178,9 @@
   <p:clrMapOvr>
     <a:masterClrMapping/>
   </p:clrMapOvr>
+  <p:transition spd="slow">
+    <p:push/>
+  </p:transition>
   <p:timing>
     <p:tnLst>
       <p:par>
@@ -9309,6 +9662,52 @@
           </a:p>
         </p:txBody>
       </p:sp>
+      <p:sp>
+        <p:nvSpPr>
+          <p:cNvPr id="5" name="Date Placeholder 4"/>
+          <p:cNvSpPr>
+            <a:spLocks noGrp="1"/>
+          </p:cNvSpPr>
+          <p:nvPr>
+            <p:ph type="dt" sz="half" idx="10"/>
+          </p:nvPr>
+        </p:nvSpPr>
+        <p:spPr/>
+        <p:txBody>
+          <a:bodyPr/>
+          <a:lstStyle/>
+          <a:p>
+            <a:fld id="{AA1998E3-05F3-4B02-B513-DD96DA156603}" type="datetime1">
+              <a:rPr lang="de-AT" smtClean="0"/>
+              <a:t>29.01.2015</a:t>
+            </a:fld>
+            <a:endParaRPr lang="de-AT"/>
+          </a:p>
+        </p:txBody>
+      </p:sp>
+      <p:sp>
+        <p:nvSpPr>
+          <p:cNvPr id="6" name="Slide Number Placeholder 5"/>
+          <p:cNvSpPr>
+            <a:spLocks noGrp="1"/>
+          </p:cNvSpPr>
+          <p:nvPr>
+            <p:ph type="sldNum" sz="quarter" idx="12"/>
+          </p:nvPr>
+        </p:nvSpPr>
+        <p:spPr/>
+        <p:txBody>
+          <a:bodyPr/>
+          <a:lstStyle/>
+          <a:p>
+            <a:fld id="{4637FC0D-AE17-4C51-98EC-5EFAFF6C163A}" type="slidenum">
+              <a:rPr lang="de-AT" smtClean="0"/>
+              <a:t>7</a:t>
+            </a:fld>
+            <a:endParaRPr lang="de-AT"/>
+          </a:p>
+        </p:txBody>
+      </p:sp>
     </p:spTree>
     <p:extLst>
       <p:ext uri="{BB962C8B-B14F-4D97-AF65-F5344CB8AC3E}">
@@ -9319,6 +9718,9 @@
   <p:clrMapOvr>
     <a:masterClrMapping/>
   </p:clrMapOvr>
+  <p:transition spd="slow">
+    <p:push/>
+  </p:transition>
   <p:timing>
     <p:tnLst>
       <p:par>
@@ -11685,6 +12087,52 @@
           </a:p>
         </p:txBody>
       </p:sp>
+      <p:sp>
+        <p:nvSpPr>
+          <p:cNvPr id="6" name="Date Placeholder 5"/>
+          <p:cNvSpPr>
+            <a:spLocks noGrp="1"/>
+          </p:cNvSpPr>
+          <p:nvPr>
+            <p:ph type="dt" sz="half" idx="10"/>
+          </p:nvPr>
+        </p:nvSpPr>
+        <p:spPr/>
+        <p:txBody>
+          <a:bodyPr/>
+          <a:lstStyle/>
+          <a:p>
+            <a:fld id="{41F04409-F0E1-4259-B886-5606EE499EC7}" type="datetime1">
+              <a:rPr lang="de-AT" smtClean="0"/>
+              <a:t>29.01.2015</a:t>
+            </a:fld>
+            <a:endParaRPr lang="de-AT"/>
+          </a:p>
+        </p:txBody>
+      </p:sp>
+      <p:sp>
+        <p:nvSpPr>
+          <p:cNvPr id="7" name="Slide Number Placeholder 6"/>
+          <p:cNvSpPr>
+            <a:spLocks noGrp="1"/>
+          </p:cNvSpPr>
+          <p:nvPr>
+            <p:ph type="sldNum" sz="quarter" idx="12"/>
+          </p:nvPr>
+        </p:nvSpPr>
+        <p:spPr/>
+        <p:txBody>
+          <a:bodyPr/>
+          <a:lstStyle/>
+          <a:p>
+            <a:fld id="{4637FC0D-AE17-4C51-98EC-5EFAFF6C163A}" type="slidenum">
+              <a:rPr lang="de-AT" smtClean="0"/>
+              <a:t>8</a:t>
+            </a:fld>
+            <a:endParaRPr lang="de-AT"/>
+          </a:p>
+        </p:txBody>
+      </p:sp>
     </p:spTree>
     <p:extLst>
       <p:ext uri="{BB962C8B-B14F-4D97-AF65-F5344CB8AC3E}">
@@ -11695,6 +12143,9 @@
   <p:clrMapOvr>
     <a:masterClrMapping/>
   </p:clrMapOvr>
+  <p:transition spd="slow">
+    <p:push/>
+  </p:transition>
   <p:timing>
     <p:tnLst>
       <p:par>
@@ -11755,7 +12206,7 @@
             <p:ph idx="1"/>
             <p:extLst>
               <p:ext uri="{D42A27DB-BD31-4B8C-83A1-F6EECF244321}">
-                <p14:modId xmlns:p14="http://schemas.microsoft.com/office/powerpoint/2010/main" val="3606156340"/>
+                <p14:modId xmlns:p14="http://schemas.microsoft.com/office/powerpoint/2010/main" val="3606265203"/>
               </p:ext>
             </p:extLst>
           </p:nvPr>
@@ -11772,8 +12223,9 @@
               </a:tblPr>
               <a:tblGrid>
                 <a:gridCol w="2075121"/>
-                <a:gridCol w="3182679"/>
-                <a:gridCol w="2628900"/>
+                <a:gridCol w="2782399"/>
+                <a:gridCol w="1714730"/>
+                <a:gridCol w="1314450"/>
                 <a:gridCol w="1314450"/>
                 <a:gridCol w="1314450"/>
               </a:tblGrid>
@@ -11802,7 +12254,7 @@
                   </a:txBody>
                   <a:tcPr/>
                 </a:tc>
-                <a:tc>
+                <a:tc gridSpan="2">
                   <a:txBody>
                     <a:bodyPr/>
                     <a:lstStyle/>
@@ -11812,6 +12264,16 @@
                         <a:t>Neo4j</a:t>
                       </a:r>
                       <a:endParaRPr lang="de-AT" dirty="0"/>
+                    </a:p>
+                  </a:txBody>
+                  <a:tcPr/>
+                </a:tc>
+                <a:tc hMerge="1">
+                  <a:txBody>
+                    <a:bodyPr/>
+                    <a:lstStyle/>
+                    <a:p>
+                      <a:endParaRPr lang="de-AT"/>
                     </a:p>
                   </a:txBody>
                   <a:tcPr/>
@@ -11870,7 +12332,7 @@
                   </a:txBody>
                   <a:tcPr/>
                 </a:tc>
-                <a:tc>
+                <a:tc gridSpan="2">
                   <a:txBody>
                     <a:bodyPr/>
                     <a:lstStyle/>
@@ -11880,6 +12342,16 @@
                         <a:t>3m30s</a:t>
                       </a:r>
                       <a:endParaRPr lang="de-AT" dirty="0"/>
+                    </a:p>
+                  </a:txBody>
+                  <a:tcPr/>
+                </a:tc>
+                <a:tc hMerge="1">
+                  <a:txBody>
+                    <a:bodyPr/>
+                    <a:lstStyle/>
+                    <a:p>
+                      <a:endParaRPr lang="de-AT"/>
                     </a:p>
                   </a:txBody>
                   <a:tcPr/>
@@ -11934,7 +12406,7 @@
                   </a:txBody>
                   <a:tcPr/>
                 </a:tc>
-                <a:tc>
+                <a:tc gridSpan="2">
                   <a:txBody>
                     <a:bodyPr/>
                     <a:lstStyle/>
@@ -11944,6 +12416,16 @@
                         <a:t>4.7s</a:t>
                       </a:r>
                       <a:endParaRPr lang="de-AT" dirty="0"/>
+                    </a:p>
+                  </a:txBody>
+                  <a:tcPr/>
+                </a:tc>
+                <a:tc hMerge="1">
+                  <a:txBody>
+                    <a:bodyPr/>
+                    <a:lstStyle/>
+                    <a:p>
+                      <a:endParaRPr lang="de-AT"/>
                     </a:p>
                   </a:txBody>
                   <a:tcPr/>
@@ -11998,7 +12480,7 @@
                   </a:txBody>
                   <a:tcPr/>
                 </a:tc>
-                <a:tc>
+                <a:tc gridSpan="2">
                   <a:txBody>
                     <a:bodyPr/>
                     <a:lstStyle/>
@@ -12008,6 +12490,16 @@
                         <a:t>3m15s</a:t>
                       </a:r>
                       <a:endParaRPr lang="de-AT" dirty="0"/>
+                    </a:p>
+                  </a:txBody>
+                  <a:tcPr/>
+                </a:tc>
+                <a:tc hMerge="1">
+                  <a:txBody>
+                    <a:bodyPr/>
+                    <a:lstStyle/>
+                    <a:p>
+                      <a:endParaRPr lang="de-AT"/>
                     </a:p>
                   </a:txBody>
                   <a:tcPr/>
@@ -12062,7 +12554,7 @@
                   </a:txBody>
                   <a:tcPr/>
                 </a:tc>
-                <a:tc>
+                <a:tc gridSpan="2">
                   <a:txBody>
                     <a:bodyPr/>
                     <a:lstStyle/>
@@ -12072,6 +12564,16 @@
                         <a:t>11.3s</a:t>
                       </a:r>
                       <a:endParaRPr lang="de-AT" dirty="0"/>
+                    </a:p>
+                  </a:txBody>
+                  <a:tcPr/>
+                </a:tc>
+                <a:tc hMerge="1">
+                  <a:txBody>
+                    <a:bodyPr/>
+                    <a:lstStyle/>
+                    <a:p>
+                      <a:endParaRPr lang="de-AT"/>
                     </a:p>
                   </a:txBody>
                   <a:tcPr/>
@@ -12109,11 +12611,27 @@
                     <a:p>
                       <a:r>
                         <a:rPr lang="en-US" dirty="0" smtClean="0"/>
-                        <a:t>Find First</a:t>
+                        <a:t>Find </a:t>
+                      </a:r>
+                      <a:r>
+                        <a:rPr lang="en-US" dirty="0" smtClean="0"/>
+                        <a:t>sources with</a:t>
                       </a:r>
                       <a:r>
                         <a:rPr lang="en-US" baseline="0" dirty="0" smtClean="0"/>
-                        <a:t> Links to Philosophy (33)</a:t>
+                        <a:t> </a:t>
+                      </a:r>
+                      <a:r>
+                        <a:rPr lang="en-US" dirty="0" smtClean="0"/>
+                        <a:t>first</a:t>
+                      </a:r>
+                      <a:r>
+                        <a:rPr lang="en-US" baseline="0" dirty="0" smtClean="0"/>
+                        <a:t> links </a:t>
+                      </a:r>
+                      <a:r>
+                        <a:rPr lang="en-US" baseline="0" dirty="0" smtClean="0"/>
+                        <a:t>to Philosophy (33)</a:t>
                       </a:r>
                       <a:endParaRPr lang="de-AT" dirty="0"/>
                     </a:p>
@@ -12130,7 +12648,7 @@
                   </a:txBody>
                   <a:tcPr/>
                 </a:tc>
-                <a:tc>
+                <a:tc gridSpan="2">
                   <a:txBody>
                     <a:bodyPr/>
                     <a:lstStyle/>
@@ -12144,6 +12662,16 @@
                   </a:txBody>
                   <a:tcPr/>
                 </a:tc>
+                <a:tc hMerge="1">
+                  <a:txBody>
+                    <a:bodyPr/>
+                    <a:lstStyle/>
+                    <a:p>
+                      <a:endParaRPr lang="de-AT"/>
+                    </a:p>
+                  </a:txBody>
+                  <a:tcPr/>
+                </a:tc>
                 <a:tc gridSpan="2">
                   <a:txBody>
                     <a:bodyPr/>
@@ -12151,7 +12679,7 @@
                     <a:p>
                       <a:r>
                         <a:rPr lang="en-US" dirty="0" smtClean="0"/>
-                        <a:t>70-80ms</a:t>
+                        <a:t>32ms</a:t>
                       </a:r>
                       <a:endParaRPr lang="de-AT" dirty="0"/>
                     </a:p>
@@ -12181,7 +12709,11 @@
                       </a:r>
                       <a:r>
                         <a:rPr lang="en-US" baseline="0" dirty="0" smtClean="0"/>
-                        <a:t> Sources of Philosophy (all links)</a:t>
+                        <a:t> </a:t>
+                      </a:r>
+                      <a:r>
+                        <a:rPr lang="en-US" baseline="0" dirty="0" smtClean="0"/>
+                        <a:t>sources with links to Jesus</a:t>
                       </a:r>
                       <a:endParaRPr lang="de-AT" dirty="0"/>
                     </a:p>
@@ -12206,6 +12738,20 @@
                       <a:r>
                         <a:rPr lang="en-US" dirty="0" smtClean="0"/>
                         <a:t>Count</a:t>
+                      </a:r>
+                      <a:endParaRPr lang="de-AT" dirty="0"/>
+                    </a:p>
+                  </a:txBody>
+                  <a:tcPr/>
+                </a:tc>
+                <a:tc>
+                  <a:txBody>
+                    <a:bodyPr/>
+                    <a:lstStyle/>
+                    <a:p>
+                      <a:r>
+                        <a:rPr lang="de-AT" dirty="0" smtClean="0"/>
+                        <a:t>All Data</a:t>
                       </a:r>
                       <a:endParaRPr lang="de-AT" dirty="0"/>
                     </a:p>
@@ -12273,7 +12819,21 @@
                     <a:p>
                       <a:r>
                         <a:rPr lang="en-US" dirty="0" smtClean="0"/>
-                        <a:t>39ms</a:t>
+                        <a:t>40ms</a:t>
+                      </a:r>
+                      <a:endParaRPr lang="de-AT" dirty="0"/>
+                    </a:p>
+                  </a:txBody>
+                  <a:tcPr/>
+                </a:tc>
+                <a:tc>
+                  <a:txBody>
+                    <a:bodyPr/>
+                    <a:lstStyle/>
+                    <a:p>
+                      <a:r>
+                        <a:rPr lang="de-AT" dirty="0" smtClean="0"/>
+                        <a:t>38ms</a:t>
                       </a:r>
                       <a:endParaRPr lang="de-AT" dirty="0"/>
                     </a:p>
@@ -12318,7 +12878,7 @@
                     <a:p>
                       <a:r>
                         <a:rPr lang="en-US" dirty="0" smtClean="0"/>
-                        <a:t>37ms</a:t>
+                        <a:t>35ms</a:t>
                       </a:r>
                       <a:endParaRPr lang="de-AT" dirty="0"/>
                     </a:p>
@@ -12362,7 +12922,21 @@
                     <a:p>
                       <a:r>
                         <a:rPr lang="en-US" dirty="0" smtClean="0"/>
-                        <a:t>50ms</a:t>
+                        <a:t>55ms</a:t>
+                      </a:r>
+                      <a:endParaRPr lang="de-AT" dirty="0"/>
+                    </a:p>
+                  </a:txBody>
+                  <a:tcPr/>
+                </a:tc>
+                <a:tc>
+                  <a:txBody>
+                    <a:bodyPr/>
+                    <a:lstStyle/>
+                    <a:p>
+                      <a:r>
+                        <a:rPr lang="de-AT" dirty="0" smtClean="0"/>
+                        <a:t>142ms</a:t>
                       </a:r>
                       <a:endParaRPr lang="de-AT" dirty="0"/>
                     </a:p>
@@ -12376,7 +12950,7 @@
                     <a:p>
                       <a:r>
                         <a:rPr lang="en-US" dirty="0" smtClean="0"/>
-                        <a:t>71ms</a:t>
+                        <a:t>103ms</a:t>
                       </a:r>
                       <a:endParaRPr lang="de-AT" dirty="0"/>
                     </a:p>
@@ -12390,7 +12964,7 @@
                     <a:p>
                       <a:r>
                         <a:rPr lang="en-US" dirty="0" smtClean="0"/>
-                        <a:t>80ms</a:t>
+                        <a:t>105ms</a:t>
                       </a:r>
                       <a:endParaRPr lang="de-AT" dirty="0"/>
                     </a:p>
@@ -12447,7 +13021,7 @@
                       </a:pPr>
                       <a:r>
                         <a:rPr lang="en-US" dirty="0" smtClean="0"/>
-                        <a:t>530ms</a:t>
+                        <a:t>91ms</a:t>
                       </a:r>
                       <a:endParaRPr lang="de-AT" dirty="0" smtClean="0">
                         <a:solidFill>
@@ -12463,9 +13037,54 @@
                     <a:bodyPr/>
                     <a:lstStyle/>
                     <a:p>
+                      <a:pPr marL="0" marR="0" indent="0" algn="l" defTabSz="914400" rtl="0" eaLnBrk="1" fontAlgn="auto" latinLnBrk="0" hangingPunct="1">
+                        <a:lnSpc>
+                          <a:spcPct val="100000"/>
+                        </a:lnSpc>
+                        <a:spcBef>
+                          <a:spcPts val="0"/>
+                        </a:spcBef>
+                        <a:spcAft>
+                          <a:spcPts val="0"/>
+                        </a:spcAft>
+                        <a:buClrTx/>
+                        <a:buSzTx/>
+                        <a:buFontTx/>
+                        <a:buNone/>
+                        <a:tabLst/>
+                        <a:defRPr/>
+                      </a:pPr>
+                      <a:r>
+                        <a:rPr lang="de-AT" sz="1800" kern="1200" dirty="0" smtClean="0">
+                          <a:solidFill>
+                            <a:schemeClr val="tx1"/>
+                          </a:solidFill>
+                          <a:latin typeface="+mn-lt"/>
+                          <a:ea typeface="+mn-ea"/>
+                          <a:cs typeface="+mn-cs"/>
+                        </a:rPr>
+                        <a:t>682ms</a:t>
+                      </a:r>
+                      <a:endParaRPr lang="de-AT" sz="1800" kern="1200" dirty="0" smtClean="0">
+                        <a:solidFill>
+                          <a:schemeClr val="tx1"/>
+                        </a:solidFill>
+                        <a:latin typeface="+mn-lt"/>
+                        <a:ea typeface="+mn-ea"/>
+                        <a:cs typeface="+mn-cs"/>
+                      </a:endParaRPr>
+                    </a:p>
+                  </a:txBody>
+                  <a:tcPr/>
+                </a:tc>
+                <a:tc>
+                  <a:txBody>
+                    <a:bodyPr/>
+                    <a:lstStyle/>
+                    <a:p>
                       <a:r>
                         <a:rPr lang="en-US" dirty="0" smtClean="0"/>
-                        <a:t>139ms</a:t>
+                        <a:t>210ms</a:t>
                       </a:r>
                       <a:endParaRPr lang="de-AT" dirty="0"/>
                     </a:p>
@@ -12479,7 +13098,7 @@
                     <a:p>
                       <a:r>
                         <a:rPr lang="en-US" dirty="0" smtClean="0"/>
-                        <a:t>282ms</a:t>
+                        <a:t>375ms</a:t>
                       </a:r>
                       <a:endParaRPr lang="de-AT" dirty="0"/>
                     </a:p>
@@ -12519,7 +13138,21 @@
                     <a:p>
                       <a:r>
                         <a:rPr lang="en-US" dirty="0" smtClean="0"/>
-                        <a:t>34.7s</a:t>
+                        <a:t>2s</a:t>
+                      </a:r>
+                      <a:endParaRPr lang="de-AT" dirty="0"/>
+                    </a:p>
+                  </a:txBody>
+                  <a:tcPr/>
+                </a:tc>
+                <a:tc>
+                  <a:txBody>
+                    <a:bodyPr/>
+                    <a:lstStyle/>
+                    <a:p>
+                      <a:r>
+                        <a:rPr lang="de-AT" dirty="0" smtClean="0"/>
+                        <a:t>4.8s</a:t>
                       </a:r>
                       <a:endParaRPr lang="de-AT" dirty="0"/>
                     </a:p>
@@ -12533,7 +13166,7 @@
                     <a:p>
                       <a:r>
                         <a:rPr lang="en-US" dirty="0" smtClean="0"/>
-                        <a:t>1.1s</a:t>
+                        <a:t>421ms</a:t>
                       </a:r>
                       <a:endParaRPr lang="de-AT" dirty="0"/>
                     </a:p>
@@ -12547,7 +13180,7 @@
                     <a:p>
                       <a:r>
                         <a:rPr lang="en-US" dirty="0" smtClean="0"/>
-                        <a:t>6.2s</a:t>
+                        <a:t>452ms</a:t>
                       </a:r>
                       <a:endParaRPr lang="de-AT" dirty="0"/>
                     </a:p>
@@ -12580,6 +13213,35 @@
                   </a:txBody>
                   <a:tcPr/>
                 </a:tc>
+                <a:tc gridSpan="2">
+                  <a:txBody>
+                    <a:bodyPr/>
+                    <a:lstStyle/>
+                    <a:p>
+                      <a:pPr algn="l"/>
+                      <a:r>
+                        <a:rPr lang="de-AT" dirty="0" smtClean="0"/>
+                        <a:t>aborted after </a:t>
+                      </a:r>
+                      <a:r>
+                        <a:rPr lang="de-AT" dirty="0" smtClean="0"/>
+                        <a:t>10min</a:t>
+                      </a:r>
+                      <a:endParaRPr lang="de-AT" dirty="0"/>
+                    </a:p>
+                  </a:txBody>
+                  <a:tcPr/>
+                </a:tc>
+                <a:tc hMerge="1">
+                  <a:txBody>
+                    <a:bodyPr/>
+                    <a:lstStyle/>
+                    <a:p>
+                      <a:endParaRPr lang="de-AT" dirty="0"/>
+                    </a:p>
+                  </a:txBody>
+                  <a:tcPr/>
+                </a:tc>
                 <a:tc>
                   <a:txBody>
                     <a:bodyPr/>
@@ -12587,7 +13249,7 @@
                     <a:p>
                       <a:r>
                         <a:rPr lang="de-AT" dirty="0" smtClean="0"/>
-                        <a:t>aborted after 20min</a:t>
+                        <a:t>3s</a:t>
                       </a:r>
                       <a:endParaRPr lang="de-AT" dirty="0"/>
                     </a:p>
@@ -12601,21 +13263,7 @@
                     <a:p>
                       <a:r>
                         <a:rPr lang="de-AT" dirty="0" smtClean="0"/>
-                        <a:t>26.7s</a:t>
-                      </a:r>
-                      <a:endParaRPr lang="de-AT" dirty="0"/>
-                    </a:p>
-                  </a:txBody>
-                  <a:tcPr/>
-                </a:tc>
-                <a:tc>
-                  <a:txBody>
-                    <a:bodyPr/>
-                    <a:lstStyle/>
-                    <a:p>
-                      <a:r>
-                        <a:rPr lang="de-AT" dirty="0" smtClean="0"/>
-                        <a:t>205.8s</a:t>
+                        <a:t>3s</a:t>
                       </a:r>
                       <a:endParaRPr lang="de-AT" dirty="0"/>
                     </a:p>
@@ -12627,6 +13275,52 @@
           </a:graphicData>
         </a:graphic>
       </p:graphicFrame>
+      <p:sp>
+        <p:nvSpPr>
+          <p:cNvPr id="3" name="Date Placeholder 2"/>
+          <p:cNvSpPr>
+            <a:spLocks noGrp="1"/>
+          </p:cNvSpPr>
+          <p:nvPr>
+            <p:ph type="dt" sz="half" idx="10"/>
+          </p:nvPr>
+        </p:nvSpPr>
+        <p:spPr/>
+        <p:txBody>
+          <a:bodyPr/>
+          <a:lstStyle/>
+          <a:p>
+            <a:fld id="{F2BFD50A-FB6F-4DC8-9E15-FACB0A372CA3}" type="datetime1">
+              <a:rPr lang="de-AT" smtClean="0"/>
+              <a:t>29.01.2015</a:t>
+            </a:fld>
+            <a:endParaRPr lang="de-AT"/>
+          </a:p>
+        </p:txBody>
+      </p:sp>
+      <p:sp>
+        <p:nvSpPr>
+          <p:cNvPr id="4" name="Slide Number Placeholder 3"/>
+          <p:cNvSpPr>
+            <a:spLocks noGrp="1"/>
+          </p:cNvSpPr>
+          <p:nvPr>
+            <p:ph type="sldNum" sz="quarter" idx="12"/>
+          </p:nvPr>
+        </p:nvSpPr>
+        <p:spPr/>
+        <p:txBody>
+          <a:bodyPr/>
+          <a:lstStyle/>
+          <a:p>
+            <a:fld id="{4637FC0D-AE17-4C51-98EC-5EFAFF6C163A}" type="slidenum">
+              <a:rPr lang="de-AT" smtClean="0"/>
+              <a:t>9</a:t>
+            </a:fld>
+            <a:endParaRPr lang="de-AT"/>
+          </a:p>
+        </p:txBody>
+      </p:sp>
     </p:spTree>
     <p:extLst>
       <p:ext uri="{BB962C8B-B14F-4D97-AF65-F5344CB8AC3E}">
@@ -12637,6 +13331,9 @@
   <p:clrMapOvr>
     <a:masterClrMapping/>
   </p:clrMapOvr>
+  <p:transition spd="slow">
+    <p:push/>
+  </p:transition>
   <p:timing>
     <p:tnLst>
       <p:par>

</xml_diff>